<commit_message>
Helm: update the presentation fole
</commit_message>
<xml_diff>
--- a/helm/documents/Helm_Knowledge_Sharing.pptx
+++ b/helm/documents/Helm_Knowledge_Sharing.pptx
@@ -34,6 +34,11 @@
     <p:sldId id="278" r:id="rId29"/>
     <p:sldId id="279" r:id="rId30"/>
     <p:sldId id="280" r:id="rId31"/>
+    <p:sldId id="281" r:id="rId32"/>
+    <p:sldId id="282" r:id="rId33"/>
+    <p:sldId id="283" r:id="rId34"/>
+    <p:sldId id="284" r:id="rId35"/>
+    <p:sldId id="285" r:id="rId36"/>
   </p:sldIdLst>
   <p:sldSz cx="12192000" cy="6858000"/>
   <p:notesSz cx="7559675" cy="10691812"/>
@@ -6853,7 +6858,7 @@
         <p:spPr>
           <a:xfrm>
             <a:off x="0" y="0"/>
-            <a:ext cx="12190320" cy="5150520"/>
+            <a:ext cx="12189960" cy="5150160"/>
           </a:xfrm>
           <a:prstGeom prst="rect">
             <a:avLst/>
@@ -6885,7 +6890,7 @@
         <p:spPr>
           <a:xfrm>
             <a:off x="10582200" y="5243760"/>
-            <a:ext cx="1356120" cy="1356120"/>
+            <a:ext cx="1355760" cy="1355760"/>
           </a:xfrm>
           <a:prstGeom prst="rect">
             <a:avLst/>
@@ -6904,7 +6909,7 @@
         <p:spPr>
           <a:xfrm>
             <a:off x="1637280" y="753120"/>
-            <a:ext cx="7856640" cy="3937680"/>
+            <a:ext cx="7856280" cy="3937320"/>
           </a:xfrm>
           <a:prstGeom prst="rect">
             <a:avLst/>
@@ -6937,7 +6942,7 @@
         <p:spPr>
           <a:xfrm>
             <a:off x="7681680" y="1234080"/>
-            <a:ext cx="3846240" cy="3686760"/>
+            <a:ext cx="3845880" cy="3686400"/>
           </a:xfrm>
           <a:prstGeom prst="rect">
             <a:avLst/>
@@ -6960,7 +6965,7 @@
         <p:spPr>
           <a:xfrm>
             <a:off x="609480" y="273600"/>
-            <a:ext cx="10972080" cy="1144440"/>
+            <a:ext cx="10972440" cy="1144800"/>
           </a:xfrm>
           <a:prstGeom prst="rect">
             <a:avLst/>
@@ -6971,13 +6976,20 @@
             <a:noAutofit/>
           </a:bodyPr>
           <a:p>
-            <a:r>
-              <a:rPr b="0" lang="en-US" sz="1800" spc="-1" strike="noStrike">
-                <a:latin typeface="Arial"/>
-              </a:rPr>
-              <a:t>Click to edit the title text format</a:t>
-            </a:r>
-            <a:endParaRPr b="0" lang="en-US" sz="1800" spc="-1" strike="noStrike">
+            <a:pPr algn="ctr"/>
+            <a:r>
+              <a:rPr b="0" lang="en-US" sz="4400" spc="-1" strike="noStrike">
+                <a:latin typeface="Arial"/>
+              </a:rPr>
+              <a:t>Click to edit the </a:t>
+            </a:r>
+            <a:r>
+              <a:rPr b="0" lang="en-US" sz="4400" spc="-1" strike="noStrike">
+                <a:latin typeface="Arial"/>
+              </a:rPr>
+              <a:t>title text format</a:t>
+            </a:r>
+            <a:endParaRPr b="0" lang="en-US" sz="4400" spc="-1" strike="noStrike">
               <a:latin typeface="Arial"/>
             </a:endParaRPr>
           </a:p>
@@ -6996,7 +7008,7 @@
         <p:spPr>
           <a:xfrm>
             <a:off x="609480" y="1604520"/>
-            <a:ext cx="10972080" cy="3976920"/>
+            <a:ext cx="10972440" cy="3977280"/>
           </a:xfrm>
           <a:prstGeom prst="rect">
             <a:avLst/>
@@ -7019,12 +7031,12 @@
               <a:buChar char=""/>
             </a:pPr>
             <a:r>
-              <a:rPr b="0" lang="en-US" sz="1800" spc="-1" strike="noStrike">
+              <a:rPr b="0" lang="en-US" sz="3200" spc="-1" strike="noStrike">
                 <a:latin typeface="Arial"/>
               </a:rPr>
               <a:t>Click to edit the outline text format</a:t>
             </a:r>
-            <a:endParaRPr b="0" lang="en-US" sz="1800" spc="-1" strike="noStrike">
+            <a:endParaRPr b="0" lang="en-US" sz="3200" spc="-1" strike="noStrike">
               <a:latin typeface="Arial"/>
             </a:endParaRPr>
           </a:p>
@@ -7041,12 +7053,12 @@
               <a:buChar char=""/>
             </a:pPr>
             <a:r>
-              <a:rPr b="0" lang="en-US" sz="1800" spc="-1" strike="noStrike">
+              <a:rPr b="0" lang="en-US" sz="2800" spc="-1" strike="noStrike">
                 <a:latin typeface="Arial"/>
               </a:rPr>
               <a:t>Second Outline Level</a:t>
             </a:r>
-            <a:endParaRPr b="0" lang="en-US" sz="1800" spc="-1" strike="noStrike">
+            <a:endParaRPr b="0" lang="en-US" sz="2800" spc="-1" strike="noStrike">
               <a:latin typeface="Arial"/>
             </a:endParaRPr>
           </a:p>
@@ -7063,12 +7075,12 @@
               <a:buChar char=""/>
             </a:pPr>
             <a:r>
-              <a:rPr b="0" lang="en-US" sz="1800" spc="-1" strike="noStrike">
+              <a:rPr b="0" lang="en-US" sz="2400" spc="-1" strike="noStrike">
                 <a:latin typeface="Arial"/>
               </a:rPr>
               <a:t>Third Outline Level</a:t>
             </a:r>
-            <a:endParaRPr b="0" lang="en-US" sz="1800" spc="-1" strike="noStrike">
+            <a:endParaRPr b="0" lang="en-US" sz="2400" spc="-1" strike="noStrike">
               <a:latin typeface="Arial"/>
             </a:endParaRPr>
           </a:p>
@@ -7085,12 +7097,12 @@
               <a:buChar char=""/>
             </a:pPr>
             <a:r>
-              <a:rPr b="0" lang="en-US" sz="1800" spc="-1" strike="noStrike">
+              <a:rPr b="0" lang="en-US" sz="2000" spc="-1" strike="noStrike">
                 <a:latin typeface="Arial"/>
               </a:rPr>
               <a:t>Fourth Outline Level</a:t>
             </a:r>
-            <a:endParaRPr b="0" lang="en-US" sz="1800" spc="-1" strike="noStrike">
+            <a:endParaRPr b="0" lang="en-US" sz="2000" spc="-1" strike="noStrike">
               <a:latin typeface="Arial"/>
             </a:endParaRPr>
           </a:p>
@@ -7107,12 +7119,12 @@
               <a:buChar char=""/>
             </a:pPr>
             <a:r>
-              <a:rPr b="0" lang="en-US" sz="1800" spc="-1" strike="noStrike">
+              <a:rPr b="0" lang="en-US" sz="2000" spc="-1" strike="noStrike">
                 <a:latin typeface="Arial"/>
               </a:rPr>
               <a:t>Fifth Outline Level</a:t>
             </a:r>
-            <a:endParaRPr b="0" lang="en-US" sz="1800" spc="-1" strike="noStrike">
+            <a:endParaRPr b="0" lang="en-US" sz="2000" spc="-1" strike="noStrike">
               <a:latin typeface="Arial"/>
             </a:endParaRPr>
           </a:p>
@@ -7129,12 +7141,12 @@
               <a:buChar char=""/>
             </a:pPr>
             <a:r>
-              <a:rPr b="0" lang="en-US" sz="1800" spc="-1" strike="noStrike">
+              <a:rPr b="0" lang="en-US" sz="2000" spc="-1" strike="noStrike">
                 <a:latin typeface="Arial"/>
               </a:rPr>
               <a:t>Sixth Outline Level</a:t>
             </a:r>
-            <a:endParaRPr b="0" lang="en-US" sz="1800" spc="-1" strike="noStrike">
+            <a:endParaRPr b="0" lang="en-US" sz="2000" spc="-1" strike="noStrike">
               <a:latin typeface="Arial"/>
             </a:endParaRPr>
           </a:p>
@@ -7151,12 +7163,12 @@
               <a:buChar char=""/>
             </a:pPr>
             <a:r>
-              <a:rPr b="0" lang="en-US" sz="1800" spc="-1" strike="noStrike">
+              <a:rPr b="0" lang="en-US" sz="2000" spc="-1" strike="noStrike">
                 <a:latin typeface="Arial"/>
               </a:rPr>
               <a:t>Seventh Outline Level</a:t>
             </a:r>
-            <a:endParaRPr b="0" lang="en-US" sz="1800" spc="-1" strike="noStrike">
+            <a:endParaRPr b="0" lang="en-US" sz="2000" spc="-1" strike="noStrike">
               <a:latin typeface="Arial"/>
             </a:endParaRPr>
           </a:p>
@@ -7215,7 +7227,7 @@
         <p:spPr>
           <a:xfrm>
             <a:off x="360" y="0"/>
-            <a:ext cx="4775400" cy="6856200"/>
+            <a:ext cx="4775040" cy="6855840"/>
           </a:xfrm>
           <a:prstGeom prst="rect">
             <a:avLst/>
@@ -7243,7 +7255,7 @@
         <p:spPr>
           <a:xfrm>
             <a:off x="1166400" y="2958480"/>
-            <a:ext cx="2394000" cy="759960"/>
+            <a:ext cx="2393640" cy="759960"/>
           </a:xfrm>
           <a:prstGeom prst="rect">
             <a:avLst/>
@@ -7294,7 +7306,7 @@
         <p:spPr>
           <a:xfrm>
             <a:off x="828000" y="1931400"/>
-            <a:ext cx="3070440" cy="2993400"/>
+            <a:ext cx="3070080" cy="2993040"/>
           </a:xfrm>
           <a:prstGeom prst="rect">
             <a:avLst/>
@@ -7323,7 +7335,7 @@
         <p:spPr>
           <a:xfrm>
             <a:off x="0" y="6719040"/>
-            <a:ext cx="12190320" cy="151200"/>
+            <a:ext cx="12189960" cy="150840"/>
           </a:xfrm>
           <a:prstGeom prst="rect">
             <a:avLst/>
@@ -7619,7 +7631,7 @@
         <p:spPr>
           <a:xfrm>
             <a:off x="360" y="6719040"/>
-            <a:ext cx="12178440" cy="139320"/>
+            <a:ext cx="12178080" cy="138960"/>
           </a:xfrm>
           <a:prstGeom prst="rect">
             <a:avLst/>
@@ -8093,7 +8105,7 @@
         <p:spPr>
           <a:xfrm>
             <a:off x="360" y="6719040"/>
-            <a:ext cx="12178440" cy="139320"/>
+            <a:ext cx="12178080" cy="138960"/>
           </a:xfrm>
           <a:prstGeom prst="rect">
             <a:avLst/>
@@ -8389,7 +8401,7 @@
         <p:spPr>
           <a:xfrm>
             <a:off x="0" y="0"/>
-            <a:ext cx="12190320" cy="5150520"/>
+            <a:ext cx="12189960" cy="5150160"/>
           </a:xfrm>
           <a:prstGeom prst="rect">
             <a:avLst/>
@@ -8417,7 +8429,7 @@
         <p:spPr>
           <a:xfrm>
             <a:off x="2915640" y="1431720"/>
-            <a:ext cx="6359040" cy="2729520"/>
+            <a:ext cx="6358680" cy="2729160"/>
           </a:xfrm>
           <a:prstGeom prst="rect">
             <a:avLst/>
@@ -8450,7 +8462,7 @@
         <p:spPr>
           <a:xfrm>
             <a:off x="10991880" y="5744160"/>
-            <a:ext cx="956520" cy="956520"/>
+            <a:ext cx="956160" cy="956160"/>
           </a:xfrm>
           <a:prstGeom prst="rect">
             <a:avLst/>
@@ -8469,7 +8481,7 @@
         <p:spPr>
           <a:xfrm>
             <a:off x="3764880" y="2243520"/>
-            <a:ext cx="4644360" cy="1095120"/>
+            <a:ext cx="4644000" cy="1095120"/>
           </a:xfrm>
           <a:prstGeom prst="rect">
             <a:avLst/>
@@ -8793,7 +8805,7 @@
         <p:spPr>
           <a:xfrm>
             <a:off x="565560" y="6150240"/>
-            <a:ext cx="4181400" cy="292320"/>
+            <a:ext cx="4181040" cy="291960"/>
           </a:xfrm>
           <a:prstGeom prst="rect">
             <a:avLst/>
@@ -8850,7 +8862,7 @@
         <p:spPr>
           <a:xfrm>
             <a:off x="2043360" y="1116360"/>
-            <a:ext cx="5783400" cy="2958480"/>
+            <a:ext cx="5783040" cy="2958120"/>
           </a:xfrm>
           <a:prstGeom prst="rect">
             <a:avLst/>
@@ -8925,7 +8937,7 @@
         <p:spPr>
           <a:xfrm>
             <a:off x="566280" y="5740560"/>
-            <a:ext cx="5650200" cy="362520"/>
+            <a:ext cx="5649840" cy="362160"/>
           </a:xfrm>
           <a:prstGeom prst="rect">
             <a:avLst/>
@@ -9012,7 +9024,7 @@
         <p:spPr>
           <a:xfrm>
             <a:off x="685800" y="0"/>
-            <a:ext cx="10960200" cy="1132560"/>
+            <a:ext cx="10959840" cy="1132200"/>
           </a:xfrm>
           <a:prstGeom prst="rect">
             <a:avLst/>
@@ -9078,7 +9090,7 @@
         <p:spPr>
           <a:xfrm>
             <a:off x="274320" y="1554480"/>
-            <a:ext cx="11063520" cy="4479840"/>
+            <a:ext cx="11063160" cy="4479480"/>
           </a:xfrm>
           <a:prstGeom prst="rect">
             <a:avLst/>
@@ -9102,7 +9114,7 @@
             <a:noAutofit/>
           </a:bodyPr>
           <a:p>
-            <a:pPr marL="216000" indent="-215280">
+            <a:pPr marL="216000" indent="-214920">
               <a:lnSpc>
                 <a:spcPct val="100000"/>
               </a:lnSpc>
@@ -9203,7 +9215,7 @@
             </a:endParaRPr>
           </a:p>
           <a:p>
-            <a:pPr marL="216000" indent="-215280">
+            <a:pPr marL="216000" indent="-214920">
               <a:lnSpc>
                 <a:spcPct val="100000"/>
               </a:lnSpc>
@@ -9294,7 +9306,7 @@
             </a:endParaRPr>
           </a:p>
           <a:p>
-            <a:pPr marL="216000" indent="-215280">
+            <a:pPr marL="216000" indent="-214920">
               <a:lnSpc>
                 <a:spcPct val="100000"/>
               </a:lnSpc>
@@ -9333,7 +9345,7 @@
             </a:endParaRPr>
           </a:p>
           <a:p>
-            <a:pPr marL="216000" indent="-215280">
+            <a:pPr marL="216000" indent="-214920">
               <a:lnSpc>
                 <a:spcPct val="100000"/>
               </a:lnSpc>
@@ -9402,7 +9414,7 @@
         <p:spPr>
           <a:xfrm>
             <a:off x="10515240" y="6202080"/>
-            <a:ext cx="1587600" cy="414720"/>
+            <a:ext cx="1587240" cy="414360"/>
           </a:xfrm>
           <a:prstGeom prst="rect">
             <a:avLst/>
@@ -9428,7 +9440,7 @@
                 <a:spcPct val="100000"/>
               </a:lnSpc>
             </a:pPr>
-            <a:fld id="{69C65F2C-B52C-478D-9403-56CFB9B24779}" type="slidenum">
+            <a:fld id="{C8B5439C-BE26-4535-BBEF-59F2AA30D605}" type="slidenum">
               <a:rPr b="0" lang="en-US" sz="1600" spc="-1" strike="noStrike">
                 <a:solidFill>
                   <a:srgbClr val="000000"/>
@@ -9483,7 +9495,7 @@
         <p:spPr>
           <a:xfrm>
             <a:off x="685800" y="0"/>
-            <a:ext cx="10960200" cy="1132560"/>
+            <a:ext cx="10959840" cy="1132200"/>
           </a:xfrm>
           <a:prstGeom prst="rect">
             <a:avLst/>
@@ -9549,7 +9561,7 @@
         <p:spPr>
           <a:xfrm>
             <a:off x="274320" y="1554480"/>
-            <a:ext cx="11063520" cy="4479840"/>
+            <a:ext cx="11063160" cy="4479480"/>
           </a:xfrm>
           <a:prstGeom prst="rect">
             <a:avLst/>
@@ -9573,7 +9585,7 @@
             <a:noAutofit/>
           </a:bodyPr>
           <a:p>
-            <a:pPr marL="216000" indent="-215280">
+            <a:pPr marL="216000" indent="-214920">
               <a:lnSpc>
                 <a:spcPct val="100000"/>
               </a:lnSpc>
@@ -9676,7 +9688,7 @@
             </a:endParaRPr>
           </a:p>
           <a:p>
-            <a:pPr marL="216000" indent="-215280">
+            <a:pPr marL="216000" indent="-214920">
               <a:lnSpc>
                 <a:spcPct val="100000"/>
               </a:lnSpc>
@@ -9745,7 +9757,7 @@
         <p:spPr>
           <a:xfrm>
             <a:off x="10515240" y="6202080"/>
-            <a:ext cx="1587600" cy="414720"/>
+            <a:ext cx="1587240" cy="414360"/>
           </a:xfrm>
           <a:prstGeom prst="rect">
             <a:avLst/>
@@ -9771,7 +9783,7 @@
                 <a:spcPct val="100000"/>
               </a:lnSpc>
             </a:pPr>
-            <a:fld id="{6F4EA949-AEE8-4601-926C-A05ED789CB0E}" type="slidenum">
+            <a:fld id="{CE01488D-47CC-44E4-BE3B-7C42A28CCC33}" type="slidenum">
               <a:rPr b="0" lang="en-US" sz="1600" spc="-1" strike="noStrike">
                 <a:solidFill>
                   <a:srgbClr val="000000"/>
@@ -9800,7 +9812,7 @@
         <p:spPr>
           <a:xfrm>
             <a:off x="694440" y="4099320"/>
-            <a:ext cx="8810640" cy="218160"/>
+            <a:ext cx="8810280" cy="217800"/>
           </a:xfrm>
           <a:prstGeom prst="rect">
             <a:avLst/>
@@ -9852,7 +9864,7 @@
         <p:spPr>
           <a:xfrm>
             <a:off x="685800" y="0"/>
-            <a:ext cx="10960200" cy="1132560"/>
+            <a:ext cx="10959840" cy="1132200"/>
           </a:xfrm>
           <a:prstGeom prst="rect">
             <a:avLst/>
@@ -9901,7 +9913,17 @@
                 <a:latin typeface="Arial"/>
                 <a:ea typeface="Noto Sans CJK SC"/>
               </a:rPr>
-              <a:t>Helm CLI commands - 1</a:t>
+              <a:t>Helm CLI commands </a:t>
+            </a:r>
+            <a:r>
+              <a:rPr b="0" lang="en-US" sz="2200" spc="-1" strike="noStrike">
+                <a:solidFill>
+                  <a:srgbClr val="000000"/>
+                </a:solidFill>
+                <a:latin typeface="Arial"/>
+                <a:ea typeface="Noto Sans CJK SC"/>
+              </a:rPr>
+              <a:t>- 1</a:t>
             </a:r>
             <a:endParaRPr b="0" lang="en-US" sz="2200" spc="-1" strike="noStrike">
               <a:latin typeface="Arial"/>
@@ -9918,7 +9940,7 @@
         <p:spPr>
           <a:xfrm>
             <a:off x="274320" y="1554480"/>
-            <a:ext cx="11063520" cy="4479840"/>
+            <a:ext cx="11063160" cy="4479480"/>
           </a:xfrm>
           <a:prstGeom prst="rect">
             <a:avLst/>
@@ -9942,7 +9964,7 @@
             <a:noAutofit/>
           </a:bodyPr>
           <a:p>
-            <a:pPr marL="216000" indent="-216000">
+            <a:pPr marL="216000" indent="-215640">
               <a:lnSpc>
                 <a:spcPct val="100000"/>
               </a:lnSpc>
@@ -9991,7 +10013,7 @@
             </a:endParaRPr>
           </a:p>
           <a:p>
-            <a:pPr marL="216000" indent="-216000">
+            <a:pPr marL="216000" indent="-215640">
               <a:lnSpc>
                 <a:spcPct val="100000"/>
               </a:lnSpc>
@@ -10061,7 +10083,59 @@
             </a:endParaRPr>
           </a:p>
           <a:p>
-            <a:pPr marL="216000" indent="-216000">
+            <a:pPr>
+              <a:lnSpc>
+                <a:spcPct val="100000"/>
+              </a:lnSpc>
+              <a:spcBef>
+                <a:spcPts val="1417"/>
+              </a:spcBef>
+            </a:pPr>
+            <a:endParaRPr b="0" lang="en-US" sz="1800" spc="-1" strike="noStrike">
+              <a:latin typeface="Arial"/>
+            </a:endParaRPr>
+          </a:p>
+          <a:p>
+            <a:pPr>
+              <a:lnSpc>
+                <a:spcPct val="100000"/>
+              </a:lnSpc>
+              <a:spcBef>
+                <a:spcPts val="1417"/>
+              </a:spcBef>
+            </a:pPr>
+            <a:endParaRPr b="0" lang="en-US" sz="1800" spc="-1" strike="noStrike">
+              <a:latin typeface="Arial"/>
+            </a:endParaRPr>
+          </a:p>
+          <a:p>
+            <a:pPr>
+              <a:lnSpc>
+                <a:spcPct val="100000"/>
+              </a:lnSpc>
+              <a:spcBef>
+                <a:spcPts val="1417"/>
+              </a:spcBef>
+            </a:pPr>
+            <a:endParaRPr b="0" lang="en-US" sz="1800" spc="-1" strike="noStrike">
+              <a:latin typeface="Arial"/>
+            </a:endParaRPr>
+          </a:p>
+          <a:p>
+            <a:pPr>
+              <a:lnSpc>
+                <a:spcPct val="100000"/>
+              </a:lnSpc>
+              <a:spcBef>
+                <a:spcPts val="1417"/>
+              </a:spcBef>
+            </a:pPr>
+            <a:endParaRPr b="0" lang="en-US" sz="1800" spc="-1" strike="noStrike">
+              <a:latin typeface="Arial"/>
+            </a:endParaRPr>
+          </a:p>
+          <a:p>
+            <a:pPr marL="216000" indent="-215640">
               <a:lnSpc>
                 <a:spcPct val="100000"/>
               </a:lnSpc>
@@ -10075,82 +10149,6 @@
               <a:buFont typeface="Wingdings" charset="2"/>
               <a:buChar char=""/>
             </a:pPr>
-            <a:endParaRPr b="0" lang="en-US" sz="1800" spc="-1" strike="noStrike">
-              <a:latin typeface="Arial"/>
-            </a:endParaRPr>
-          </a:p>
-          <a:p>
-            <a:pPr marL="216000" indent="-216000">
-              <a:lnSpc>
-                <a:spcPct val="100000"/>
-              </a:lnSpc>
-              <a:spcBef>
-                <a:spcPts val="1417"/>
-              </a:spcBef>
-              <a:buClr>
-                <a:srgbClr val="000000"/>
-              </a:buClr>
-              <a:buSzPct val="45000"/>
-              <a:buFont typeface="Wingdings" charset="2"/>
-              <a:buChar char=""/>
-            </a:pPr>
-            <a:endParaRPr b="0" lang="en-US" sz="1800" spc="-1" strike="noStrike">
-              <a:latin typeface="Arial"/>
-            </a:endParaRPr>
-          </a:p>
-          <a:p>
-            <a:pPr marL="216000" indent="-216000">
-              <a:lnSpc>
-                <a:spcPct val="100000"/>
-              </a:lnSpc>
-              <a:spcBef>
-                <a:spcPts val="1417"/>
-              </a:spcBef>
-              <a:buClr>
-                <a:srgbClr val="000000"/>
-              </a:buClr>
-              <a:buSzPct val="45000"/>
-              <a:buFont typeface="Wingdings" charset="2"/>
-              <a:buChar char=""/>
-            </a:pPr>
-            <a:endParaRPr b="0" lang="en-US" sz="1800" spc="-1" strike="noStrike">
-              <a:latin typeface="Arial"/>
-            </a:endParaRPr>
-          </a:p>
-          <a:p>
-            <a:pPr marL="216000" indent="-216000">
-              <a:lnSpc>
-                <a:spcPct val="100000"/>
-              </a:lnSpc>
-              <a:spcBef>
-                <a:spcPts val="1417"/>
-              </a:spcBef>
-              <a:buClr>
-                <a:srgbClr val="000000"/>
-              </a:buClr>
-              <a:buSzPct val="45000"/>
-              <a:buFont typeface="Wingdings" charset="2"/>
-              <a:buChar char=""/>
-            </a:pPr>
-            <a:endParaRPr b="0" lang="en-US" sz="1800" spc="-1" strike="noStrike">
-              <a:latin typeface="Arial"/>
-            </a:endParaRPr>
-          </a:p>
-          <a:p>
-            <a:pPr marL="216000" indent="-216000">
-              <a:lnSpc>
-                <a:spcPct val="100000"/>
-              </a:lnSpc>
-              <a:spcBef>
-                <a:spcPts val="1417"/>
-              </a:spcBef>
-              <a:buClr>
-                <a:srgbClr val="000000"/>
-              </a:buClr>
-              <a:buSzPct val="45000"/>
-              <a:buFont typeface="Wingdings" charset="2"/>
-              <a:buChar char=""/>
-            </a:pPr>
             <a:r>
               <a:rPr b="0" lang="en-US" sz="1800" spc="-1" strike="noStrike">
                 <a:solidFill>
@@ -10197,6 +10195,15 @@
             <a:br/>
             <a:br/>
             <a:br/>
+            <a:r>
+              <a:rPr b="0" lang="en-US" sz="1800" spc="-1" strike="noStrike">
+                <a:solidFill>
+                  <a:srgbClr val="000000"/>
+                </a:solidFill>
+                <a:latin typeface="Arial"/>
+              </a:rPr>
+              <a:t> </a:t>
+            </a:r>
             <a:endParaRPr b="0" lang="en-US" sz="1800" spc="-1" strike="noStrike">
               <a:latin typeface="Arial"/>
             </a:endParaRPr>
@@ -10212,7 +10219,7 @@
         <p:spPr>
           <a:xfrm>
             <a:off x="10515240" y="6202080"/>
-            <a:ext cx="1587600" cy="414720"/>
+            <a:ext cx="1587240" cy="414360"/>
           </a:xfrm>
           <a:prstGeom prst="rect">
             <a:avLst/>
@@ -10238,7 +10245,7 @@
                 <a:spcPct val="100000"/>
               </a:lnSpc>
             </a:pPr>
-            <a:fld id="{170F148B-25A3-47AD-9B85-7E8A8AB8E4F5}" type="slidenum">
+            <a:fld id="{B8E664E5-0F23-4712-8CFF-B92538940E2E}" type="slidenum">
               <a:rPr b="0" lang="en-US" sz="1600" spc="-1" strike="noStrike">
                 <a:solidFill>
                   <a:srgbClr val="000000"/>
@@ -10267,7 +10274,7 @@
         <p:spPr>
           <a:xfrm>
             <a:off x="609840" y="2651760"/>
-            <a:ext cx="9540000" cy="1828800"/>
+            <a:ext cx="9539640" cy="1828440"/>
           </a:xfrm>
           <a:prstGeom prst="rect">
             <a:avLst/>
@@ -10293,7 +10300,7 @@
         <p:spPr>
           <a:xfrm>
             <a:off x="594720" y="4846320"/>
-            <a:ext cx="9829440" cy="342720"/>
+            <a:ext cx="9829080" cy="342360"/>
           </a:xfrm>
           <a:prstGeom prst="rect">
             <a:avLst/>
@@ -10345,7 +10352,7 @@
         <p:spPr>
           <a:xfrm>
             <a:off x="685800" y="0"/>
-            <a:ext cx="10960200" cy="1132560"/>
+            <a:ext cx="10959840" cy="1132200"/>
           </a:xfrm>
           <a:prstGeom prst="rect">
             <a:avLst/>
@@ -10394,7 +10401,17 @@
                 <a:latin typeface="Arial"/>
                 <a:ea typeface="Noto Sans CJK SC"/>
               </a:rPr>
-              <a:t>Helm CLI commands - 2</a:t>
+              <a:t>Helm CLI commands </a:t>
+            </a:r>
+            <a:r>
+              <a:rPr b="0" lang="en-US" sz="2200" spc="-1" strike="noStrike">
+                <a:solidFill>
+                  <a:srgbClr val="000000"/>
+                </a:solidFill>
+                <a:latin typeface="Arial"/>
+                <a:ea typeface="Noto Sans CJK SC"/>
+              </a:rPr>
+              <a:t>- 2</a:t>
             </a:r>
             <a:endParaRPr b="0" lang="en-US" sz="2200" spc="-1" strike="noStrike">
               <a:latin typeface="Arial"/>
@@ -10411,7 +10428,7 @@
         <p:spPr>
           <a:xfrm>
             <a:off x="274320" y="1554480"/>
-            <a:ext cx="11063520" cy="4479840"/>
+            <a:ext cx="11063160" cy="4479480"/>
           </a:xfrm>
           <a:prstGeom prst="rect">
             <a:avLst/>
@@ -10435,7 +10452,7 @@
             <a:noAutofit/>
           </a:bodyPr>
           <a:p>
-            <a:pPr marL="216000" indent="-216000">
+            <a:pPr marL="216000" indent="-215640">
               <a:lnSpc>
                 <a:spcPct val="100000"/>
               </a:lnSpc>
@@ -10484,7 +10501,7 @@
             </a:endParaRPr>
           </a:p>
           <a:p>
-            <a:pPr marL="216000" indent="-216000">
+            <a:pPr marL="216000" indent="-215640">
               <a:lnSpc>
                 <a:spcPct val="100000"/>
               </a:lnSpc>
@@ -10544,19 +10561,13 @@
             </a:endParaRPr>
           </a:p>
           <a:p>
-            <a:pPr marL="216000" indent="-216000">
+            <a:pPr>
               <a:lnSpc>
                 <a:spcPct val="100000"/>
               </a:lnSpc>
               <a:spcBef>
                 <a:spcPts val="1417"/>
               </a:spcBef>
-              <a:buClr>
-                <a:srgbClr val="000000"/>
-              </a:buClr>
-              <a:buSzPct val="45000"/>
-              <a:buFont typeface="Wingdings" charset="2"/>
-              <a:buChar char=""/>
             </a:pPr>
             <a:br/>
             <a:endParaRPr b="0" lang="en-US" sz="1800" spc="-1" strike="noStrike">
@@ -10574,7 +10585,7 @@
         <p:spPr>
           <a:xfrm>
             <a:off x="10515240" y="6202080"/>
-            <a:ext cx="1587600" cy="414720"/>
+            <a:ext cx="1587240" cy="414360"/>
           </a:xfrm>
           <a:prstGeom prst="rect">
             <a:avLst/>
@@ -10600,7 +10611,7 @@
                 <a:spcPct val="100000"/>
               </a:lnSpc>
             </a:pPr>
-            <a:fld id="{7F2D4CCF-F3D4-4D55-97FC-847F22788FC3}" type="slidenum">
+            <a:fld id="{5722FBBA-586B-4F8C-875E-801680DF0396}" type="slidenum">
               <a:rPr b="0" lang="en-US" sz="1600" spc="-1" strike="noStrike">
                 <a:solidFill>
                   <a:srgbClr val="000000"/>
@@ -10629,7 +10640,7 @@
         <p:spPr>
           <a:xfrm>
             <a:off x="640080" y="2699640"/>
-            <a:ext cx="7791120" cy="2695320"/>
+            <a:ext cx="7790760" cy="2694960"/>
           </a:xfrm>
           <a:prstGeom prst="rect">
             <a:avLst/>
@@ -10681,7 +10692,7 @@
         <p:spPr>
           <a:xfrm>
             <a:off x="685800" y="0"/>
-            <a:ext cx="10960200" cy="1132560"/>
+            <a:ext cx="10959840" cy="1132200"/>
           </a:xfrm>
           <a:prstGeom prst="rect">
             <a:avLst/>
@@ -10730,7 +10741,17 @@
                 <a:latin typeface="Arial"/>
                 <a:ea typeface="Noto Sans CJK SC"/>
               </a:rPr>
-              <a:t>Helm CLI commands - 3</a:t>
+              <a:t>Helm CLI commands </a:t>
+            </a:r>
+            <a:r>
+              <a:rPr b="0" lang="en-US" sz="2200" spc="-1" strike="noStrike">
+                <a:solidFill>
+                  <a:srgbClr val="000000"/>
+                </a:solidFill>
+                <a:latin typeface="Arial"/>
+                <a:ea typeface="Noto Sans CJK SC"/>
+              </a:rPr>
+              <a:t>- 3</a:t>
             </a:r>
             <a:endParaRPr b="0" lang="en-US" sz="2200" spc="-1" strike="noStrike">
               <a:latin typeface="Arial"/>
@@ -10747,7 +10768,7 @@
         <p:spPr>
           <a:xfrm>
             <a:off x="274320" y="1554480"/>
-            <a:ext cx="11063520" cy="4479840"/>
+            <a:ext cx="11063160" cy="4479480"/>
           </a:xfrm>
           <a:prstGeom prst="rect">
             <a:avLst/>
@@ -10771,7 +10792,7 @@
             <a:noAutofit/>
           </a:bodyPr>
           <a:p>
-            <a:pPr marL="216000" indent="-216000">
+            <a:pPr marL="216000" indent="-215640">
               <a:lnSpc>
                 <a:spcPct val="100000"/>
               </a:lnSpc>
@@ -10820,7 +10841,7 @@
             </a:endParaRPr>
           </a:p>
           <a:p>
-            <a:pPr marL="216000" indent="-216000">
+            <a:pPr marL="216000" indent="-215640">
               <a:lnSpc>
                 <a:spcPct val="100000"/>
               </a:lnSpc>
@@ -10931,19 +10952,13 @@
             </a:endParaRPr>
           </a:p>
           <a:p>
-            <a:pPr marL="216000" indent="-216000">
+            <a:pPr>
               <a:lnSpc>
                 <a:spcPct val="100000"/>
               </a:lnSpc>
               <a:spcBef>
                 <a:spcPts val="1417"/>
               </a:spcBef>
-              <a:buClr>
-                <a:srgbClr val="000000"/>
-              </a:buClr>
-              <a:buSzPct val="45000"/>
-              <a:buFont typeface="Wingdings" charset="2"/>
-              <a:buChar char=""/>
             </a:pPr>
             <a:br/>
             <a:endParaRPr b="0" lang="en-US" sz="1800" spc="-1" strike="noStrike">
@@ -10961,7 +10976,7 @@
         <p:spPr>
           <a:xfrm>
             <a:off x="10515240" y="6202080"/>
-            <a:ext cx="1587600" cy="414720"/>
+            <a:ext cx="1587240" cy="414360"/>
           </a:xfrm>
           <a:prstGeom prst="rect">
             <a:avLst/>
@@ -10987,7 +11002,7 @@
                 <a:spcPct val="100000"/>
               </a:lnSpc>
             </a:pPr>
-            <a:fld id="{05C14DD2-B71D-4442-84B4-7304FCD1DAF7}" type="slidenum">
+            <a:fld id="{6F50C719-E8AC-4D04-A48F-B24091A87C43}" type="slidenum">
               <a:rPr b="0" lang="en-US" sz="1600" spc="-1" strike="noStrike">
                 <a:solidFill>
                   <a:srgbClr val="000000"/>
@@ -11042,7 +11057,7 @@
         <p:spPr>
           <a:xfrm>
             <a:off x="685800" y="0"/>
-            <a:ext cx="10960200" cy="1132560"/>
+            <a:ext cx="10959840" cy="1132200"/>
           </a:xfrm>
           <a:prstGeom prst="rect">
             <a:avLst/>
@@ -11091,7 +11106,17 @@
                 <a:latin typeface="Arial"/>
                 <a:ea typeface="Noto Sans CJK SC"/>
               </a:rPr>
-              <a:t>Helm CLI commands - 4</a:t>
+              <a:t>Helm CLI commands </a:t>
+            </a:r>
+            <a:r>
+              <a:rPr b="0" lang="en-US" sz="2200" spc="-1" strike="noStrike">
+                <a:solidFill>
+                  <a:srgbClr val="000000"/>
+                </a:solidFill>
+                <a:latin typeface="Arial"/>
+                <a:ea typeface="Noto Sans CJK SC"/>
+              </a:rPr>
+              <a:t>- 4</a:t>
             </a:r>
             <a:endParaRPr b="0" lang="en-US" sz="2200" spc="-1" strike="noStrike">
               <a:latin typeface="Arial"/>
@@ -11108,7 +11133,7 @@
         <p:spPr>
           <a:xfrm>
             <a:off x="274320" y="1554480"/>
-            <a:ext cx="11063520" cy="4479840"/>
+            <a:ext cx="11063160" cy="4479480"/>
           </a:xfrm>
           <a:prstGeom prst="rect">
             <a:avLst/>
@@ -11132,7 +11157,7 @@
             <a:noAutofit/>
           </a:bodyPr>
           <a:p>
-            <a:pPr marL="216000" indent="-216000">
+            <a:pPr marL="216000" indent="-215640">
               <a:lnSpc>
                 <a:spcPct val="100000"/>
               </a:lnSpc>
@@ -11181,7 +11206,7 @@
             </a:endParaRPr>
           </a:p>
           <a:p>
-            <a:pPr marL="216000" indent="-216000">
+            <a:pPr marL="216000" indent="-215640">
               <a:lnSpc>
                 <a:spcPct val="100000"/>
               </a:lnSpc>
@@ -11312,19 +11337,13 @@
             </a:endParaRPr>
           </a:p>
           <a:p>
-            <a:pPr marL="216000" indent="-216000">
+            <a:pPr>
               <a:lnSpc>
                 <a:spcPct val="100000"/>
               </a:lnSpc>
               <a:spcBef>
                 <a:spcPts val="1417"/>
               </a:spcBef>
-              <a:buClr>
-                <a:srgbClr val="000000"/>
-              </a:buClr>
-              <a:buSzPct val="45000"/>
-              <a:buFont typeface="Wingdings" charset="2"/>
-              <a:buChar char=""/>
             </a:pPr>
             <a:br/>
             <a:endParaRPr b="0" lang="en-US" sz="1800" spc="-1" strike="noStrike">
@@ -11342,7 +11361,7 @@
         <p:spPr>
           <a:xfrm>
             <a:off x="10515240" y="6202080"/>
-            <a:ext cx="1587600" cy="414720"/>
+            <a:ext cx="1587240" cy="414360"/>
           </a:xfrm>
           <a:prstGeom prst="rect">
             <a:avLst/>
@@ -11368,7 +11387,7 @@
                 <a:spcPct val="100000"/>
               </a:lnSpc>
             </a:pPr>
-            <a:fld id="{5CD5FA28-8794-4AA8-A4B5-1018CE3671E7}" type="slidenum">
+            <a:fld id="{07EDA5F8-52D9-4DF7-AB40-D61C6E0F2A60}" type="slidenum">
               <a:rPr b="0" lang="en-US" sz="1600" spc="-1" strike="noStrike">
                 <a:solidFill>
                   <a:srgbClr val="000000"/>
@@ -11423,7 +11442,7 @@
         <p:spPr>
           <a:xfrm>
             <a:off x="685800" y="0"/>
-            <a:ext cx="10960200" cy="1132560"/>
+            <a:ext cx="10959840" cy="1132200"/>
           </a:xfrm>
           <a:prstGeom prst="rect">
             <a:avLst/>
@@ -11472,7 +11491,17 @@
                 <a:latin typeface="Arial"/>
                 <a:ea typeface="Noto Sans CJK SC"/>
               </a:rPr>
-              <a:t>Helm CLI commands - 5</a:t>
+              <a:t>Helm CLI commands </a:t>
+            </a:r>
+            <a:r>
+              <a:rPr b="0" lang="en-US" sz="2200" spc="-1" strike="noStrike">
+                <a:solidFill>
+                  <a:srgbClr val="000000"/>
+                </a:solidFill>
+                <a:latin typeface="Arial"/>
+                <a:ea typeface="Noto Sans CJK SC"/>
+              </a:rPr>
+              <a:t>- 5</a:t>
             </a:r>
             <a:endParaRPr b="0" lang="en-US" sz="2200" spc="-1" strike="noStrike">
               <a:latin typeface="Arial"/>
@@ -11489,7 +11518,7 @@
         <p:spPr>
           <a:xfrm>
             <a:off x="274320" y="1554480"/>
-            <a:ext cx="11063520" cy="4479840"/>
+            <a:ext cx="11063160" cy="4479480"/>
           </a:xfrm>
           <a:prstGeom prst="rect">
             <a:avLst/>
@@ -11513,7 +11542,7 @@
             <a:noAutofit/>
           </a:bodyPr>
           <a:p>
-            <a:pPr marL="216000" indent="-216000">
+            <a:pPr marL="216000" indent="-215640">
               <a:lnSpc>
                 <a:spcPct val="100000"/>
               </a:lnSpc>
@@ -11562,7 +11591,7 @@
             </a:endParaRPr>
           </a:p>
           <a:p>
-            <a:pPr marL="216000" indent="-216000">
+            <a:pPr marL="216000" indent="-215640">
               <a:lnSpc>
                 <a:spcPct val="100000"/>
               </a:lnSpc>
@@ -11612,19 +11641,13 @@
             </a:endParaRPr>
           </a:p>
           <a:p>
-            <a:pPr marL="216000" indent="-216000">
+            <a:pPr>
               <a:lnSpc>
                 <a:spcPct val="100000"/>
               </a:lnSpc>
               <a:spcBef>
                 <a:spcPts val="1417"/>
               </a:spcBef>
-              <a:buClr>
-                <a:srgbClr val="000000"/>
-              </a:buClr>
-              <a:buSzPct val="45000"/>
-              <a:buFont typeface="Wingdings" charset="2"/>
-              <a:buChar char=""/>
             </a:pPr>
             <a:br/>
             <a:endParaRPr b="0" lang="en-US" sz="1800" spc="-1" strike="noStrike">
@@ -11642,7 +11665,7 @@
         <p:spPr>
           <a:xfrm>
             <a:off x="10515240" y="6202080"/>
-            <a:ext cx="1587600" cy="414720"/>
+            <a:ext cx="1587240" cy="414360"/>
           </a:xfrm>
           <a:prstGeom prst="rect">
             <a:avLst/>
@@ -11668,7 +11691,7 @@
                 <a:spcPct val="100000"/>
               </a:lnSpc>
             </a:pPr>
-            <a:fld id="{37827F6A-5D90-4118-A23D-5CE0FB30B705}" type="slidenum">
+            <a:fld id="{6FC62BA1-E44B-4B76-97CE-DF763B1CD9DD}" type="slidenum">
               <a:rPr b="0" lang="en-US" sz="1600" spc="-1" strike="noStrike">
                 <a:solidFill>
                   <a:srgbClr val="000000"/>
@@ -11723,7 +11746,7 @@
         <p:spPr>
           <a:xfrm>
             <a:off x="685800" y="0"/>
-            <a:ext cx="10960200" cy="1132560"/>
+            <a:ext cx="10959840" cy="1132200"/>
           </a:xfrm>
           <a:prstGeom prst="rect">
             <a:avLst/>
@@ -11772,7 +11795,17 @@
                 <a:latin typeface="Arial"/>
                 <a:ea typeface="Noto Sans CJK SC"/>
               </a:rPr>
-              <a:t>Helm CLI commands - 6</a:t>
+              <a:t>Helm CLI commands </a:t>
+            </a:r>
+            <a:r>
+              <a:rPr b="0" lang="en-US" sz="2200" spc="-1" strike="noStrike">
+                <a:solidFill>
+                  <a:srgbClr val="000000"/>
+                </a:solidFill>
+                <a:latin typeface="Arial"/>
+                <a:ea typeface="Noto Sans CJK SC"/>
+              </a:rPr>
+              <a:t>- 6</a:t>
             </a:r>
             <a:endParaRPr b="0" lang="en-US" sz="2200" spc="-1" strike="noStrike">
               <a:latin typeface="Arial"/>
@@ -11789,7 +11822,7 @@
         <p:spPr>
           <a:xfrm>
             <a:off x="274320" y="1554480"/>
-            <a:ext cx="11063520" cy="4479840"/>
+            <a:ext cx="11063160" cy="4479480"/>
           </a:xfrm>
           <a:prstGeom prst="rect">
             <a:avLst/>
@@ -11813,7 +11846,7 @@
             <a:noAutofit/>
           </a:bodyPr>
           <a:p>
-            <a:pPr marL="216000" indent="-216000">
+            <a:pPr marL="216000" indent="-215640">
               <a:lnSpc>
                 <a:spcPct val="100000"/>
               </a:lnSpc>
@@ -11862,7 +11895,7 @@
             </a:endParaRPr>
           </a:p>
           <a:p>
-            <a:pPr marL="216000" indent="-216000">
+            <a:pPr marL="216000" indent="-215640">
               <a:lnSpc>
                 <a:spcPct val="100000"/>
               </a:lnSpc>
@@ -11949,6 +11982,15 @@
               <a:t> --purge my-release</a:t>
             </a:r>
             <a:br/>
+            <a:r>
+              <a:rPr b="0" lang="en-US" sz="1800" spc="-1" strike="noStrike">
+                <a:solidFill>
+                  <a:srgbClr val="000000"/>
+                </a:solidFill>
+                <a:latin typeface="Arial"/>
+              </a:rPr>
+              <a:t> </a:t>
+            </a:r>
             <a:endParaRPr b="0" lang="en-US" sz="1800" spc="-1" strike="noStrike">
               <a:latin typeface="Arial"/>
             </a:endParaRPr>
@@ -11964,7 +12006,7 @@
         <p:spPr>
           <a:xfrm>
             <a:off x="10515240" y="6202080"/>
-            <a:ext cx="1587600" cy="414720"/>
+            <a:ext cx="1587240" cy="414360"/>
           </a:xfrm>
           <a:prstGeom prst="rect">
             <a:avLst/>
@@ -11990,7 +12032,7 @@
                 <a:spcPct val="100000"/>
               </a:lnSpc>
             </a:pPr>
-            <a:fld id="{D8A9E8D1-2890-469F-BE9B-B9AB008BD693}" type="slidenum">
+            <a:fld id="{D8F431F4-971F-43C2-BDAB-A691F6153745}" type="slidenum">
               <a:rPr b="0" lang="en-US" sz="1600" spc="-1" strike="noStrike">
                 <a:solidFill>
                   <a:srgbClr val="000000"/>
@@ -12045,7 +12087,7 @@
         <p:spPr>
           <a:xfrm>
             <a:off x="685800" y="0"/>
-            <a:ext cx="10960200" cy="1132560"/>
+            <a:ext cx="10959840" cy="1132200"/>
           </a:xfrm>
           <a:prstGeom prst="rect">
             <a:avLst/>
@@ -12094,7 +12136,17 @@
                 <a:latin typeface="Arial"/>
                 <a:ea typeface="Noto Sans CJK SC"/>
               </a:rPr>
-              <a:t>Helm chart structure - 1</a:t>
+              <a:t>Helm chart structure </a:t>
+            </a:r>
+            <a:r>
+              <a:rPr b="0" lang="en-US" sz="2200" spc="-1" strike="noStrike">
+                <a:solidFill>
+                  <a:srgbClr val="000000"/>
+                </a:solidFill>
+                <a:latin typeface="Arial"/>
+                <a:ea typeface="Noto Sans CJK SC"/>
+              </a:rPr>
+              <a:t>- 1</a:t>
             </a:r>
             <a:endParaRPr b="0" lang="en-US" sz="2200" spc="-1" strike="noStrike">
               <a:latin typeface="Arial"/>
@@ -12111,7 +12163,7 @@
         <p:spPr>
           <a:xfrm>
             <a:off x="274320" y="1554480"/>
-            <a:ext cx="11063520" cy="4479840"/>
+            <a:ext cx="11063160" cy="4479480"/>
           </a:xfrm>
           <a:prstGeom prst="rect">
             <a:avLst/>
@@ -12135,7 +12187,7 @@
             <a:noAutofit/>
           </a:bodyPr>
           <a:p>
-            <a:pPr marL="216000" indent="-216000">
+            <a:pPr marL="216000" indent="-215640">
               <a:lnSpc>
                 <a:spcPct val="100000"/>
               </a:lnSpc>
@@ -12151,6 +12203,9 @@
             </a:pPr>
             <a:r>
               <a:rPr b="0" lang="en-US" sz="1800" spc="-1" strike="noStrike">
+                <a:solidFill>
+                  <a:srgbClr val="000000"/>
+                </a:solidFill>
                 <a:latin typeface="Arial"/>
                 <a:ea typeface="DejaVu Sans"/>
               </a:rPr>
@@ -12168,6 +12223,29 @@
             </a:r>
             <a:r>
               <a:rPr b="0" lang="en-US" sz="1800" spc="-1" strike="noStrike">
+                <a:solidFill>
+                  <a:srgbClr val="000000"/>
+                </a:solidFill>
+                <a:latin typeface="Arial"/>
+                <a:ea typeface="DejaVu Sans"/>
+              </a:rPr>
+              <a:t>, folders such as</a:t>
+            </a:r>
+            <a:r>
+              <a:rPr b="0" lang="en-US" sz="1800" spc="-1" strike="noStrike">
+                <a:solidFill>
+                  <a:srgbClr val="ff0000"/>
+                </a:solidFill>
+                <a:latin typeface="Arial"/>
+                <a:ea typeface="DejaVu Sans"/>
+              </a:rPr>
+              <a:t> chart</a:t>
+            </a:r>
+            <a:r>
+              <a:rPr b="0" lang="en-US" sz="1800" spc="-1" strike="noStrike">
+                <a:solidFill>
+                  <a:srgbClr val="000000"/>
+                </a:solidFill>
                 <a:latin typeface="Arial"/>
                 <a:ea typeface="DejaVu Sans"/>
               </a:rPr>
@@ -12175,37 +12253,6 @@
             </a:r>
             <a:r>
               <a:rPr b="0" lang="en-US" sz="1800" spc="-1" strike="noStrike">
-                <a:latin typeface="Arial"/>
-                <a:ea typeface="DejaVu Sans"/>
-              </a:rPr>
-              <a:t>folders such as</a:t>
-            </a:r>
-            <a:r>
-              <a:rPr b="0" lang="en-US" sz="1800" spc="-1" strike="noStrike">
-                <a:solidFill>
-                  <a:srgbClr val="ff0000"/>
-                </a:solidFill>
-                <a:latin typeface="Arial"/>
-                <a:ea typeface="DejaVu Sans"/>
-              </a:rPr>
-              <a:t> chart</a:t>
-            </a:r>
-            <a:r>
-              <a:rPr b="0" lang="en-US" sz="1800" spc="-1" strike="noStrike">
-                <a:latin typeface="Arial"/>
-                <a:ea typeface="DejaVu Sans"/>
-              </a:rPr>
-              <a:t>,</a:t>
-            </a:r>
-            <a:r>
-              <a:rPr b="0" lang="en-US" sz="1800" spc="-1" strike="noStrike">
-                <a:latin typeface="Arial"/>
-                <a:ea typeface="DejaVu Sans"/>
-              </a:rPr>
-              <a:t> </a:t>
-            </a:r>
-            <a:r>
-              <a:rPr b="0" lang="en-US" sz="1800" spc="-1" strike="noStrike">
                 <a:solidFill>
                   <a:srgbClr val="158466"/>
                 </a:solidFill>
@@ -12216,36 +12263,26 @@
             </a:r>
             <a:r>
               <a:rPr b="0" lang="en-US" sz="1800" spc="-1" strike="noStrike">
-                <a:latin typeface="Arial"/>
-                <a:ea typeface="DejaVu Sans"/>
-              </a:rPr>
-              <a:t> </a:t>
-            </a:r>
-            <a:r>
-              <a:rPr b="0" lang="en-US" sz="1800" spc="-1" strike="noStrike">
-                <a:latin typeface="Arial"/>
-                <a:ea typeface="DejaVu Sans"/>
-              </a:rPr>
-              <a:t>for deploying and managing a Kubernetes application</a:t>
+                <a:solidFill>
+                  <a:srgbClr val="000000"/>
+                </a:solidFill>
+                <a:latin typeface="Arial"/>
+                <a:ea typeface="DejaVu Sans"/>
+              </a:rPr>
+              <a:t> for deploying and managing a Kubernetes application</a:t>
             </a:r>
             <a:endParaRPr b="0" lang="en-US" sz="1800" spc="-1" strike="noStrike">
               <a:latin typeface="Arial"/>
             </a:endParaRPr>
           </a:p>
           <a:p>
-            <a:pPr marL="216000" indent="-216000">
+            <a:pPr>
               <a:lnSpc>
                 <a:spcPct val="100000"/>
               </a:lnSpc>
               <a:spcBef>
                 <a:spcPts val="1417"/>
               </a:spcBef>
-              <a:buClr>
-                <a:srgbClr val="000000"/>
-              </a:buClr>
-              <a:buSzPct val="45000"/>
-              <a:buFont typeface="Wingdings" charset="2"/>
-              <a:buChar char=""/>
             </a:pPr>
             <a:br/>
             <a:endParaRPr b="0" lang="en-US" sz="1800" spc="-1" strike="noStrike">
@@ -12263,7 +12300,7 @@
         <p:spPr>
           <a:xfrm>
             <a:off x="10515240" y="6202080"/>
-            <a:ext cx="1587600" cy="414720"/>
+            <a:ext cx="1587240" cy="414360"/>
           </a:xfrm>
           <a:prstGeom prst="rect">
             <a:avLst/>
@@ -12289,7 +12326,7 @@
                 <a:spcPct val="100000"/>
               </a:lnSpc>
             </a:pPr>
-            <a:fld id="{2A6B9389-9B3C-4B14-89EE-0C7BCA934742}" type="slidenum">
+            <a:fld id="{D6A31A22-052B-408F-87FA-5FEA0A4F3AD5}" type="slidenum">
               <a:rPr b="0" lang="en-US" sz="1600" spc="-1" strike="noStrike">
                 <a:solidFill>
                   <a:srgbClr val="000000"/>
@@ -12318,7 +12355,7 @@
         <p:spPr>
           <a:xfrm>
             <a:off x="640080" y="2377440"/>
-            <a:ext cx="6990840" cy="2704680"/>
+            <a:ext cx="6990480" cy="2704320"/>
           </a:xfrm>
           <a:prstGeom prst="rect">
             <a:avLst/>
@@ -12370,7 +12407,7 @@
         <p:spPr>
           <a:xfrm>
             <a:off x="685800" y="0"/>
-            <a:ext cx="10960200" cy="1132560"/>
+            <a:ext cx="10959840" cy="1132200"/>
           </a:xfrm>
           <a:prstGeom prst="rect">
             <a:avLst/>
@@ -12419,7 +12456,17 @@
                 <a:latin typeface="Arial"/>
                 <a:ea typeface="Noto Sans CJK SC"/>
               </a:rPr>
-              <a:t>Helm chart structure - 2</a:t>
+              <a:t>Helm chart structure </a:t>
+            </a:r>
+            <a:r>
+              <a:rPr b="0" lang="en-US" sz="2200" spc="-1" strike="noStrike">
+                <a:solidFill>
+                  <a:srgbClr val="000000"/>
+                </a:solidFill>
+                <a:latin typeface="Arial"/>
+                <a:ea typeface="Noto Sans CJK SC"/>
+              </a:rPr>
+              <a:t>- 2</a:t>
             </a:r>
             <a:endParaRPr b="0" lang="en-US" sz="2200" spc="-1" strike="noStrike">
               <a:latin typeface="Arial"/>
@@ -12436,7 +12483,7 @@
         <p:spPr>
           <a:xfrm>
             <a:off x="274320" y="1554480"/>
-            <a:ext cx="11063520" cy="4479840"/>
+            <a:ext cx="11063160" cy="4479480"/>
           </a:xfrm>
           <a:prstGeom prst="rect">
             <a:avLst/>
@@ -12460,7 +12507,7 @@
             <a:noAutofit/>
           </a:bodyPr>
           <a:p>
-            <a:pPr marL="216000" indent="-216000">
+            <a:pPr marL="216000" indent="-215640">
               <a:lnSpc>
                 <a:spcPct val="100000"/>
               </a:lnSpc>
@@ -12476,6 +12523,9 @@
             </a:pPr>
             <a:r>
               <a:rPr b="0" lang="en-US" sz="1800" spc="-1" strike="noStrike">
+                <a:solidFill>
+                  <a:srgbClr val="000000"/>
+                </a:solidFill>
                 <a:latin typeface="Arial"/>
                 <a:ea typeface="DejaVu Sans"/>
               </a:rPr>
@@ -12493,6 +12543,9 @@
             </a:r>
             <a:r>
               <a:rPr b="0" lang="en-US" sz="1800" spc="-1" strike="noStrike">
+                <a:solidFill>
+                  <a:srgbClr val="000000"/>
+                </a:solidFill>
                 <a:latin typeface="Arial"/>
                 <a:ea typeface="DejaVu Sans"/>
               </a:rPr>
@@ -12510,6 +12563,9 @@
             </a:r>
             <a:r>
               <a:rPr b="0" lang="en-US" sz="1800" spc="-1" strike="noStrike">
+                <a:solidFill>
+                  <a:srgbClr val="000000"/>
+                </a:solidFill>
                 <a:latin typeface="Arial"/>
                 <a:ea typeface="DejaVu Sans"/>
               </a:rPr>
@@ -12527,6 +12583,9 @@
             </a:r>
             <a:r>
               <a:rPr b="0" lang="en-US" sz="1800" spc="-1" strike="noStrike">
+                <a:solidFill>
+                  <a:srgbClr val="000000"/>
+                </a:solidFill>
                 <a:latin typeface="Arial"/>
                 <a:ea typeface="DejaVu Sans"/>
               </a:rPr>
@@ -12537,19 +12596,13 @@
             </a:endParaRPr>
           </a:p>
           <a:p>
-            <a:pPr marL="216000" indent="-216000">
+            <a:pPr>
               <a:lnSpc>
                 <a:spcPct val="100000"/>
               </a:lnSpc>
               <a:spcBef>
                 <a:spcPts val="1417"/>
               </a:spcBef>
-              <a:buClr>
-                <a:srgbClr val="000000"/>
-              </a:buClr>
-              <a:buSzPct val="45000"/>
-              <a:buFont typeface="Wingdings" charset="2"/>
-              <a:buChar char=""/>
             </a:pPr>
             <a:br/>
             <a:endParaRPr b="0" lang="en-US" sz="1800" spc="-1" strike="noStrike">
@@ -12567,7 +12620,7 @@
         <p:spPr>
           <a:xfrm>
             <a:off x="10515240" y="6202080"/>
-            <a:ext cx="1587600" cy="414720"/>
+            <a:ext cx="1587240" cy="414360"/>
           </a:xfrm>
           <a:prstGeom prst="rect">
             <a:avLst/>
@@ -12593,7 +12646,7 @@
                 <a:spcPct val="100000"/>
               </a:lnSpc>
             </a:pPr>
-            <a:fld id="{E4132F68-6E6D-4734-B50F-E19EBF726005}" type="slidenum">
+            <a:fld id="{C5458CCF-E338-4E2C-89AD-3BB9D03BF8EF}" type="slidenum">
               <a:rPr b="0" lang="en-US" sz="1600" spc="-1" strike="noStrike">
                 <a:solidFill>
                   <a:srgbClr val="000000"/>
@@ -12622,7 +12675,7 @@
         <p:spPr>
           <a:xfrm>
             <a:off x="606240" y="2377440"/>
-            <a:ext cx="4971600" cy="2371320"/>
+            <a:ext cx="4971240" cy="2370960"/>
           </a:xfrm>
           <a:prstGeom prst="rect">
             <a:avLst/>
@@ -12648,7 +12701,7 @@
         <p:spPr>
           <a:xfrm>
             <a:off x="6258240" y="2377440"/>
-            <a:ext cx="4714560" cy="2834640"/>
+            <a:ext cx="4714200" cy="2834280"/>
           </a:xfrm>
           <a:prstGeom prst="rect">
             <a:avLst/>
@@ -12700,7 +12753,7 @@
         <p:spPr>
           <a:xfrm>
             <a:off x="5852160" y="365760"/>
-            <a:ext cx="5214240" cy="5850720"/>
+            <a:ext cx="5213880" cy="5850360"/>
           </a:xfrm>
           <a:prstGeom prst="rect">
             <a:avLst/>
@@ -12721,7 +12774,7 @@
             <a:noAutofit/>
           </a:bodyPr>
           <a:p>
-            <a:pPr marL="343080" indent="-341280">
+            <a:pPr marL="343080" indent="-340920">
               <a:lnSpc>
                 <a:spcPct val="90000"/>
               </a:lnSpc>
@@ -12749,7 +12802,7 @@
             </a:endParaRPr>
           </a:p>
           <a:p>
-            <a:pPr lvl="1" marL="432000" indent="-214560">
+            <a:pPr lvl="1" marL="432000" indent="-214200">
               <a:lnSpc>
                 <a:spcPct val="100000"/>
               </a:lnSpc>
@@ -12778,7 +12831,7 @@
             </a:endParaRPr>
           </a:p>
           <a:p>
-            <a:pPr lvl="1" marL="432000" indent="-214560">
+            <a:pPr lvl="1" marL="432000" indent="-214200">
               <a:lnSpc>
                 <a:spcPct val="100000"/>
               </a:lnSpc>
@@ -12807,7 +12860,7 @@
             </a:endParaRPr>
           </a:p>
           <a:p>
-            <a:pPr lvl="1" marL="432000" indent="-214560">
+            <a:pPr lvl="1" marL="432000" indent="-214200">
               <a:lnSpc>
                 <a:spcPct val="100000"/>
               </a:lnSpc>
@@ -12836,7 +12889,7 @@
             </a:endParaRPr>
           </a:p>
           <a:p>
-            <a:pPr lvl="1" marL="432000" indent="-214560">
+            <a:pPr lvl="1" marL="432000" indent="-214200">
               <a:lnSpc>
                 <a:spcPct val="100000"/>
               </a:lnSpc>
@@ -12865,7 +12918,7 @@
             </a:endParaRPr>
           </a:p>
           <a:p>
-            <a:pPr marL="343080" indent="-341280">
+            <a:pPr marL="343080" indent="-340920">
               <a:lnSpc>
                 <a:spcPct val="90000"/>
               </a:lnSpc>
@@ -12893,7 +12946,7 @@
             </a:endParaRPr>
           </a:p>
           <a:p>
-            <a:pPr marL="343080" indent="-341280">
+            <a:pPr marL="343080" indent="-340920">
               <a:lnSpc>
                 <a:spcPct val="90000"/>
               </a:lnSpc>
@@ -12921,7 +12974,7 @@
             </a:endParaRPr>
           </a:p>
           <a:p>
-            <a:pPr lvl="1" marL="432000" indent="-214560">
+            <a:pPr lvl="1" marL="432000" indent="-214200">
               <a:lnSpc>
                 <a:spcPct val="100000"/>
               </a:lnSpc>
@@ -12950,7 +13003,7 @@
             </a:endParaRPr>
           </a:p>
           <a:p>
-            <a:pPr lvl="1" marL="432000" indent="-214560">
+            <a:pPr lvl="1" marL="432000" indent="-214200">
               <a:lnSpc>
                 <a:spcPct val="100000"/>
               </a:lnSpc>
@@ -12979,7 +13032,7 @@
             </a:endParaRPr>
           </a:p>
           <a:p>
-            <a:pPr lvl="1" marL="432000" indent="-214560">
+            <a:pPr lvl="1" marL="432000" indent="-214200">
               <a:lnSpc>
                 <a:spcPct val="100000"/>
               </a:lnSpc>
@@ -13008,7 +13061,7 @@
             </a:endParaRPr>
           </a:p>
           <a:p>
-            <a:pPr lvl="1" marL="432000" indent="-214560">
+            <a:pPr lvl="1" marL="432000" indent="-214200">
               <a:lnSpc>
                 <a:spcPct val="100000"/>
               </a:lnSpc>
@@ -13037,7 +13090,7 @@
             </a:endParaRPr>
           </a:p>
           <a:p>
-            <a:pPr marL="343080" indent="-341280">
+            <a:pPr marL="343080" indent="-340920">
               <a:lnSpc>
                 <a:spcPct val="90000"/>
               </a:lnSpc>
@@ -13058,101 +13111,14 @@
                 <a:latin typeface="Arial"/>
                 <a:ea typeface="DejaVu Sans"/>
               </a:rPr>
-              <a:t>Chart Repository</a:t>
+              <a:t>Helm Chart Repository</a:t>
             </a:r>
             <a:endParaRPr b="0" lang="en-US" sz="1600" spc="-1" strike="noStrike">
               <a:latin typeface="Arial"/>
             </a:endParaRPr>
           </a:p>
           <a:p>
-            <a:pPr lvl="1" marL="432000" indent="-214560">
-              <a:lnSpc>
-                <a:spcPct val="100000"/>
-              </a:lnSpc>
-              <a:spcBef>
-                <a:spcPts val="1134"/>
-              </a:spcBef>
-              <a:buClr>
-                <a:srgbClr val="000000"/>
-              </a:buClr>
-              <a:buSzPct val="45000"/>
-              <a:buFont typeface="Wingdings" charset="2"/>
-              <a:buChar char=""/>
-            </a:pPr>
-            <a:r>
-              <a:rPr b="0" lang="en-US" sz="1600" spc="-1" strike="noStrike">
-                <a:solidFill>
-                  <a:srgbClr val="3c3e41"/>
-                </a:solidFill>
-                <a:latin typeface="Arial"/>
-                <a:ea typeface="DejaVu Sans"/>
-              </a:rPr>
-              <a:t>What is a chart repository</a:t>
-            </a:r>
-            <a:endParaRPr b="0" lang="en-US" sz="1600" spc="-1" strike="noStrike">
-              <a:latin typeface="Arial"/>
-            </a:endParaRPr>
-          </a:p>
-          <a:p>
-            <a:pPr lvl="1" marL="432000" indent="-214560">
-              <a:lnSpc>
-                <a:spcPct val="100000"/>
-              </a:lnSpc>
-              <a:spcBef>
-                <a:spcPts val="1134"/>
-              </a:spcBef>
-              <a:buClr>
-                <a:srgbClr val="000000"/>
-              </a:buClr>
-              <a:buSzPct val="45000"/>
-              <a:buFont typeface="Wingdings" charset="2"/>
-              <a:buChar char=""/>
-            </a:pPr>
-            <a:r>
-              <a:rPr b="0" lang="en-US" sz="1600" spc="-1" strike="noStrike">
-                <a:solidFill>
-                  <a:srgbClr val="3c3e41"/>
-                </a:solidFill>
-                <a:latin typeface="Arial"/>
-                <a:ea typeface="DejaVu Sans"/>
-              </a:rPr>
-              <a:t>Publish helm charts to a repository</a:t>
-            </a:r>
-            <a:endParaRPr b="0" lang="en-US" sz="1600" spc="-1" strike="noStrike">
-              <a:latin typeface="Arial"/>
-            </a:endParaRPr>
-          </a:p>
-          <a:p>
-            <a:pPr lvl="1" marL="432000" indent="-214560">
-              <a:lnSpc>
-                <a:spcPct val="100000"/>
-              </a:lnSpc>
-              <a:spcBef>
-                <a:spcPts val="1134"/>
-              </a:spcBef>
-              <a:buClr>
-                <a:srgbClr val="000000"/>
-              </a:buClr>
-              <a:buSzPct val="45000"/>
-              <a:buFont typeface="Wingdings" charset="2"/>
-              <a:buChar char=""/>
-            </a:pPr>
-            <a:r>
-              <a:rPr b="0" lang="en-US" sz="1600" spc="-1" strike="noStrike">
-                <a:solidFill>
-                  <a:srgbClr val="3c3e41"/>
-                </a:solidFill>
-                <a:latin typeface="Arial"/>
-                <a:ea typeface="DejaVu Sans"/>
-              </a:rPr>
-              <a:t>Search and install charts from repositories</a:t>
-            </a:r>
-            <a:endParaRPr b="0" lang="en-US" sz="1600" spc="-1" strike="noStrike">
-              <a:latin typeface="Arial"/>
-            </a:endParaRPr>
-          </a:p>
-          <a:p>
-            <a:pPr marL="343080" indent="-341280">
+            <a:pPr marL="343080" indent="-340920">
               <a:lnSpc>
                 <a:spcPct val="90000"/>
               </a:lnSpc>
@@ -13233,7 +13199,7 @@
         <p:spPr>
           <a:xfrm>
             <a:off x="685800" y="0"/>
-            <a:ext cx="10960200" cy="1132560"/>
+            <a:ext cx="10959840" cy="1132200"/>
           </a:xfrm>
           <a:prstGeom prst="rect">
             <a:avLst/>
@@ -13282,7 +13248,17 @@
                 <a:latin typeface="Arial"/>
                 <a:ea typeface="Noto Sans CJK SC"/>
               </a:rPr>
-              <a:t>Helm chart structure - 3</a:t>
+              <a:t>Helm chart structure </a:t>
+            </a:r>
+            <a:r>
+              <a:rPr b="0" lang="en-US" sz="2200" spc="-1" strike="noStrike">
+                <a:solidFill>
+                  <a:srgbClr val="000000"/>
+                </a:solidFill>
+                <a:latin typeface="Arial"/>
+                <a:ea typeface="Noto Sans CJK SC"/>
+              </a:rPr>
+              <a:t>- 3</a:t>
             </a:r>
             <a:endParaRPr b="0" lang="en-US" sz="2200" spc="-1" strike="noStrike">
               <a:latin typeface="Arial"/>
@@ -13299,7 +13275,7 @@
         <p:spPr>
           <a:xfrm>
             <a:off x="274320" y="1554480"/>
-            <a:ext cx="11063520" cy="4479840"/>
+            <a:ext cx="11063160" cy="4479480"/>
           </a:xfrm>
           <a:prstGeom prst="rect">
             <a:avLst/>
@@ -13323,7 +13299,7 @@
             <a:noAutofit/>
           </a:bodyPr>
           <a:p>
-            <a:pPr marL="216000" indent="-216000">
+            <a:pPr marL="216000" indent="-215640">
               <a:lnSpc>
                 <a:spcPct val="100000"/>
               </a:lnSpc>
@@ -13339,6 +13315,9 @@
             </a:pPr>
             <a:r>
               <a:rPr b="0" lang="en-US" sz="1800" spc="-1" strike="noStrike">
+                <a:solidFill>
+                  <a:srgbClr val="000000"/>
+                </a:solidFill>
                 <a:latin typeface="Arial"/>
                 <a:ea typeface="DejaVu Sans"/>
               </a:rPr>
@@ -13356,6 +13335,9 @@
             </a:r>
             <a:r>
               <a:rPr b="0" lang="en-US" sz="1800" spc="-1" strike="noStrike">
+                <a:solidFill>
+                  <a:srgbClr val="000000"/>
+                </a:solidFill>
                 <a:latin typeface="Arial"/>
                 <a:ea typeface="DejaVu Sans"/>
               </a:rPr>
@@ -13373,6 +13355,9 @@
             </a:r>
             <a:r>
               <a:rPr b="0" lang="en-US" sz="1800" spc="-1" strike="noStrike">
+                <a:solidFill>
+                  <a:srgbClr val="000000"/>
+                </a:solidFill>
                 <a:latin typeface="Arial"/>
                 <a:ea typeface="DejaVu Sans"/>
               </a:rPr>
@@ -13390,6 +13375,9 @@
             </a:r>
             <a:r>
               <a:rPr b="0" lang="en-US" sz="1800" spc="-1" strike="noStrike">
+                <a:solidFill>
+                  <a:srgbClr val="000000"/>
+                </a:solidFill>
                 <a:latin typeface="Arial"/>
                 <a:ea typeface="DejaVu Sans"/>
               </a:rPr>
@@ -13400,19 +13388,13 @@
             </a:endParaRPr>
           </a:p>
           <a:p>
-            <a:pPr marL="216000" indent="-216000">
+            <a:pPr>
               <a:lnSpc>
                 <a:spcPct val="100000"/>
               </a:lnSpc>
               <a:spcBef>
                 <a:spcPts val="1417"/>
               </a:spcBef>
-              <a:buClr>
-                <a:srgbClr val="000000"/>
-              </a:buClr>
-              <a:buSzPct val="45000"/>
-              <a:buFont typeface="Wingdings" charset="2"/>
-              <a:buChar char=""/>
             </a:pPr>
             <a:br/>
             <a:endParaRPr b="0" lang="en-US" sz="1800" spc="-1" strike="noStrike">
@@ -13430,7 +13412,7 @@
         <p:spPr>
           <a:xfrm>
             <a:off x="10515240" y="6202080"/>
-            <a:ext cx="1587600" cy="414720"/>
+            <a:ext cx="1587240" cy="414360"/>
           </a:xfrm>
           <a:prstGeom prst="rect">
             <a:avLst/>
@@ -13456,7 +13438,7 @@
                 <a:spcPct val="100000"/>
               </a:lnSpc>
             </a:pPr>
-            <a:fld id="{D3BEEB87-EEBB-433B-8A51-DD062268E348}" type="slidenum">
+            <a:fld id="{161D6349-4EAD-4F12-B949-16FA665E45B8}" type="slidenum">
               <a:rPr b="0" lang="en-US" sz="1600" spc="-1" strike="noStrike">
                 <a:solidFill>
                   <a:srgbClr val="000000"/>
@@ -13464,7 +13446,7 @@
                 <a:latin typeface="Times New Roman"/>
                 <a:ea typeface="DejaVu Sans"/>
               </a:rPr>
-              <a:t>&lt;number&gt;</a:t>
+              <a:t>1</a:t>
             </a:fld>
             <a:endParaRPr b="0" lang="en-US" sz="1600" spc="-1" strike="noStrike">
               <a:latin typeface="Arial"/>
@@ -13485,7 +13467,7 @@
         <p:spPr>
           <a:xfrm>
             <a:off x="598680" y="1924560"/>
-            <a:ext cx="3333240" cy="1275840"/>
+            <a:ext cx="3332880" cy="1275480"/>
           </a:xfrm>
           <a:prstGeom prst="rect">
             <a:avLst/>
@@ -13537,7 +13519,7 @@
         <p:spPr>
           <a:xfrm>
             <a:off x="685800" y="0"/>
-            <a:ext cx="10960200" cy="1132560"/>
+            <a:ext cx="10959840" cy="1132200"/>
           </a:xfrm>
           <a:prstGeom prst="rect">
             <a:avLst/>
@@ -13586,7 +13568,17 @@
                 <a:latin typeface="Arial"/>
                 <a:ea typeface="Noto Sans CJK SC"/>
               </a:rPr>
-              <a:t>Helm chart structure - 4</a:t>
+              <a:t>Helm chart structure </a:t>
+            </a:r>
+            <a:r>
+              <a:rPr b="0" lang="en-US" sz="2200" spc="-1" strike="noStrike">
+                <a:solidFill>
+                  <a:srgbClr val="000000"/>
+                </a:solidFill>
+                <a:latin typeface="Arial"/>
+                <a:ea typeface="Noto Sans CJK SC"/>
+              </a:rPr>
+              <a:t>- 4</a:t>
             </a:r>
             <a:endParaRPr b="0" lang="en-US" sz="2200" spc="-1" strike="noStrike">
               <a:latin typeface="Arial"/>
@@ -13603,7 +13595,7 @@
         <p:spPr>
           <a:xfrm>
             <a:off x="274320" y="1554480"/>
-            <a:ext cx="11063520" cy="4479840"/>
+            <a:ext cx="11063160" cy="4479480"/>
           </a:xfrm>
           <a:prstGeom prst="rect">
             <a:avLst/>
@@ -13627,7 +13619,7 @@
             <a:noAutofit/>
           </a:bodyPr>
           <a:p>
-            <a:pPr marL="216000" indent="-216000">
+            <a:pPr marL="216000" indent="-215640">
               <a:lnSpc>
                 <a:spcPct val="100000"/>
               </a:lnSpc>
@@ -13643,6 +13635,9 @@
             </a:pPr>
             <a:r>
               <a:rPr b="0" lang="en-US" sz="1800" spc="-1" strike="noStrike">
+                <a:solidFill>
+                  <a:srgbClr val="000000"/>
+                </a:solidFill>
                 <a:latin typeface="Arial"/>
                 <a:ea typeface="DejaVu Sans"/>
               </a:rPr>
@@ -13660,6 +13655,9 @@
             </a:r>
             <a:r>
               <a:rPr b="0" lang="en-US" sz="1800" spc="-1" strike="noStrike">
+                <a:solidFill>
+                  <a:srgbClr val="000000"/>
+                </a:solidFill>
                 <a:latin typeface="Arial"/>
                 <a:ea typeface="DejaVu Sans"/>
               </a:rPr>
@@ -13677,6 +13675,9 @@
             </a:r>
             <a:r>
               <a:rPr b="0" lang="en-US" sz="1800" spc="-1" strike="noStrike">
+                <a:solidFill>
+                  <a:srgbClr val="000000"/>
+                </a:solidFill>
                 <a:latin typeface="Arial"/>
                 <a:ea typeface="DejaVu Sans"/>
               </a:rPr>
@@ -13694,6 +13695,9 @@
             </a:r>
             <a:r>
               <a:rPr b="0" lang="en-US" sz="1800" spc="-1" strike="noStrike">
+                <a:solidFill>
+                  <a:srgbClr val="000000"/>
+                </a:solidFill>
                 <a:latin typeface="Arial"/>
                 <a:ea typeface="DejaVu Sans"/>
               </a:rPr>
@@ -13704,19 +13708,13 @@
             </a:endParaRPr>
           </a:p>
           <a:p>
-            <a:pPr marL="216000" indent="-216000">
+            <a:pPr>
               <a:lnSpc>
                 <a:spcPct val="100000"/>
               </a:lnSpc>
               <a:spcBef>
                 <a:spcPts val="1417"/>
               </a:spcBef>
-              <a:buClr>
-                <a:srgbClr val="000000"/>
-              </a:buClr>
-              <a:buSzPct val="45000"/>
-              <a:buFont typeface="Wingdings" charset="2"/>
-              <a:buChar char=""/>
             </a:pPr>
             <a:br/>
             <a:endParaRPr b="0" lang="en-US" sz="1800" spc="-1" strike="noStrike">
@@ -13734,7 +13732,7 @@
         <p:spPr>
           <a:xfrm>
             <a:off x="10515240" y="6202080"/>
-            <a:ext cx="1587600" cy="414720"/>
+            <a:ext cx="1587240" cy="414360"/>
           </a:xfrm>
           <a:prstGeom prst="rect">
             <a:avLst/>
@@ -13760,7 +13758,7 @@
                 <a:spcPct val="100000"/>
               </a:lnSpc>
             </a:pPr>
-            <a:fld id="{A55F9852-2274-4D26-A160-FE85115C3632}" type="slidenum">
+            <a:fld id="{52078B4A-2063-4C55-80CC-CDFE4C8A4F7A}" type="slidenum">
               <a:rPr b="0" lang="en-US" sz="1600" spc="-1" strike="noStrike">
                 <a:solidFill>
                   <a:srgbClr val="000000"/>
@@ -13768,7 +13766,7 @@
                 <a:latin typeface="Times New Roman"/>
                 <a:ea typeface="DejaVu Sans"/>
               </a:rPr>
-              <a:t>&lt;number&gt;</a:t>
+              <a:t>1</a:t>
             </a:fld>
             <a:endParaRPr b="0" lang="en-US" sz="1600" spc="-1" strike="noStrike">
               <a:latin typeface="Arial"/>
@@ -13789,7 +13787,7 @@
         <p:spPr>
           <a:xfrm>
             <a:off x="499320" y="2103120"/>
-            <a:ext cx="5352840" cy="1285560"/>
+            <a:ext cx="5352480" cy="1285200"/>
           </a:xfrm>
           <a:prstGeom prst="rect">
             <a:avLst/>
@@ -13815,7 +13813,7 @@
         <p:spPr>
           <a:xfrm>
             <a:off x="5943600" y="2103120"/>
-            <a:ext cx="4686120" cy="3866760"/>
+            <a:ext cx="4685760" cy="3866400"/>
           </a:xfrm>
           <a:prstGeom prst="rect">
             <a:avLst/>
@@ -13867,7 +13865,7 @@
         <p:spPr>
           <a:xfrm>
             <a:off x="685800" y="0"/>
-            <a:ext cx="10960200" cy="1132560"/>
+            <a:ext cx="10959840" cy="1132200"/>
           </a:xfrm>
           <a:prstGeom prst="rect">
             <a:avLst/>
@@ -13916,7 +13914,17 @@
                 <a:latin typeface="Arial"/>
                 <a:ea typeface="Noto Sans CJK SC"/>
               </a:rPr>
-              <a:t>Helm chart structure - 5</a:t>
+              <a:t>Helm chart structure </a:t>
+            </a:r>
+            <a:r>
+              <a:rPr b="0" lang="en-US" sz="2200" spc="-1" strike="noStrike">
+                <a:solidFill>
+                  <a:srgbClr val="000000"/>
+                </a:solidFill>
+                <a:latin typeface="Arial"/>
+                <a:ea typeface="Noto Sans CJK SC"/>
+              </a:rPr>
+              <a:t>- 5</a:t>
             </a:r>
             <a:endParaRPr b="0" lang="en-US" sz="2200" spc="-1" strike="noStrike">
               <a:latin typeface="Arial"/>
@@ -13933,7 +13941,7 @@
         <p:spPr>
           <a:xfrm>
             <a:off x="274320" y="1554480"/>
-            <a:ext cx="11063520" cy="4479840"/>
+            <a:ext cx="11063160" cy="4479480"/>
           </a:xfrm>
           <a:prstGeom prst="rect">
             <a:avLst/>
@@ -13957,7 +13965,7 @@
             <a:noAutofit/>
           </a:bodyPr>
           <a:p>
-            <a:pPr marL="216000" indent="-216000">
+            <a:pPr marL="216000" indent="-215640">
               <a:lnSpc>
                 <a:spcPct val="100000"/>
               </a:lnSpc>
@@ -13973,6 +13981,9 @@
             </a:pPr>
             <a:r>
               <a:rPr b="0" lang="en-US" sz="1800" spc="-1" strike="noStrike">
+                <a:solidFill>
+                  <a:srgbClr val="000000"/>
+                </a:solidFill>
                 <a:latin typeface="Arial"/>
                 <a:ea typeface="DejaVu Sans"/>
               </a:rPr>
@@ -13990,6 +14001,9 @@
             </a:r>
             <a:r>
               <a:rPr b="0" lang="en-US" sz="1800" spc="-1" strike="noStrike">
+                <a:solidFill>
+                  <a:srgbClr val="000000"/>
+                </a:solidFill>
                 <a:latin typeface="Arial"/>
                 <a:ea typeface="DejaVu Sans"/>
               </a:rPr>
@@ -14000,19 +14014,13 @@
             </a:endParaRPr>
           </a:p>
           <a:p>
-            <a:pPr marL="216000" indent="-216000">
+            <a:pPr>
               <a:lnSpc>
                 <a:spcPct val="100000"/>
               </a:lnSpc>
               <a:spcBef>
                 <a:spcPts val="1417"/>
               </a:spcBef>
-              <a:buClr>
-                <a:srgbClr val="000000"/>
-              </a:buClr>
-              <a:buSzPct val="45000"/>
-              <a:buFont typeface="Wingdings" charset="2"/>
-              <a:buChar char=""/>
             </a:pPr>
             <a:br/>
             <a:endParaRPr b="0" lang="en-US" sz="1800" spc="-1" strike="noStrike">
@@ -14030,7 +14038,7 @@
         <p:spPr>
           <a:xfrm>
             <a:off x="10515240" y="6202080"/>
-            <a:ext cx="1587600" cy="414720"/>
+            <a:ext cx="1587240" cy="414360"/>
           </a:xfrm>
           <a:prstGeom prst="rect">
             <a:avLst/>
@@ -14056,7 +14064,7 @@
                 <a:spcPct val="100000"/>
               </a:lnSpc>
             </a:pPr>
-            <a:fld id="{2E4F47CA-6A3F-4636-AA55-777FCFF5DBDA}" type="slidenum">
+            <a:fld id="{AD103651-4E3F-4F15-BF0B-7FC7E5C41A7F}" type="slidenum">
               <a:rPr b="0" lang="en-US" sz="1600" spc="-1" strike="noStrike">
                 <a:solidFill>
                   <a:srgbClr val="000000"/>
@@ -14064,7 +14072,7 @@
                 <a:latin typeface="Times New Roman"/>
                 <a:ea typeface="DejaVu Sans"/>
               </a:rPr>
-              <a:t>&lt;number&gt;</a:t>
+              <a:t>1</a:t>
             </a:fld>
             <a:endParaRPr b="0" lang="en-US" sz="1600" spc="-1" strike="noStrike">
               <a:latin typeface="Arial"/>
@@ -14085,7 +14093,7 @@
         <p:spPr>
           <a:xfrm>
             <a:off x="640080" y="2011680"/>
-            <a:ext cx="3003840" cy="2461680"/>
+            <a:ext cx="3003480" cy="2461320"/>
           </a:xfrm>
           <a:prstGeom prst="rect">
             <a:avLst/>
@@ -14137,7 +14145,7 @@
         <p:spPr>
           <a:xfrm>
             <a:off x="685800" y="0"/>
-            <a:ext cx="10960200" cy="1132560"/>
+            <a:ext cx="10959840" cy="1132200"/>
           </a:xfrm>
           <a:prstGeom prst="rect">
             <a:avLst/>
@@ -14186,7 +14194,17 @@
                 <a:latin typeface="Arial"/>
                 <a:ea typeface="Noto Sans CJK SC"/>
               </a:rPr>
-              <a:t>Helm chart structure - 6</a:t>
+              <a:t>Helm chart structure </a:t>
+            </a:r>
+            <a:r>
+              <a:rPr b="0" lang="en-US" sz="2200" spc="-1" strike="noStrike">
+                <a:solidFill>
+                  <a:srgbClr val="000000"/>
+                </a:solidFill>
+                <a:latin typeface="Arial"/>
+                <a:ea typeface="Noto Sans CJK SC"/>
+              </a:rPr>
+              <a:t>- 6</a:t>
             </a:r>
             <a:endParaRPr b="0" lang="en-US" sz="2200" spc="-1" strike="noStrike">
               <a:latin typeface="Arial"/>
@@ -14203,7 +14221,7 @@
         <p:spPr>
           <a:xfrm>
             <a:off x="274320" y="1554480"/>
-            <a:ext cx="11063520" cy="4479840"/>
+            <a:ext cx="11063160" cy="4479480"/>
           </a:xfrm>
           <a:prstGeom prst="rect">
             <a:avLst/>
@@ -14227,7 +14245,7 @@
             <a:noAutofit/>
           </a:bodyPr>
           <a:p>
-            <a:pPr marL="216000" indent="-216000">
+            <a:pPr marL="216000" indent="-215640">
               <a:lnSpc>
                 <a:spcPct val="100000"/>
               </a:lnSpc>
@@ -14243,6 +14261,9 @@
             </a:pPr>
             <a:r>
               <a:rPr b="0" lang="en-US" sz="1800" spc="-1" strike="noStrike">
+                <a:solidFill>
+                  <a:srgbClr val="000000"/>
+                </a:solidFill>
                 <a:latin typeface="Arial"/>
                 <a:ea typeface="DejaVu Sans"/>
               </a:rPr>
@@ -14260,6 +14281,9 @@
             </a:r>
             <a:r>
               <a:rPr b="0" lang="en-US" sz="1800" spc="-1" strike="noStrike">
+                <a:solidFill>
+                  <a:srgbClr val="000000"/>
+                </a:solidFill>
                 <a:latin typeface="Arial"/>
                 <a:ea typeface="DejaVu Sans"/>
               </a:rPr>
@@ -14270,19 +14294,13 @@
             </a:endParaRPr>
           </a:p>
           <a:p>
-            <a:pPr marL="216000" indent="-216000">
+            <a:pPr>
               <a:lnSpc>
                 <a:spcPct val="100000"/>
               </a:lnSpc>
               <a:spcBef>
                 <a:spcPts val="1417"/>
               </a:spcBef>
-              <a:buClr>
-                <a:srgbClr val="000000"/>
-              </a:buClr>
-              <a:buSzPct val="45000"/>
-              <a:buFont typeface="Wingdings" charset="2"/>
-              <a:buChar char=""/>
             </a:pPr>
             <a:br/>
             <a:endParaRPr b="0" lang="en-US" sz="1800" spc="-1" strike="noStrike">
@@ -14300,7 +14318,7 @@
         <p:spPr>
           <a:xfrm>
             <a:off x="10515240" y="6202080"/>
-            <a:ext cx="1587600" cy="414720"/>
+            <a:ext cx="1587240" cy="414360"/>
           </a:xfrm>
           <a:prstGeom prst="rect">
             <a:avLst/>
@@ -14326,7 +14344,7 @@
                 <a:spcPct val="100000"/>
               </a:lnSpc>
             </a:pPr>
-            <a:fld id="{444F7B43-367B-4D48-98A2-24E00ED005B0}" type="slidenum">
+            <a:fld id="{7C8296B3-A87C-4C7D-AB9C-0D8CF15035A1}" type="slidenum">
               <a:rPr b="0" lang="en-US" sz="1600" spc="-1" strike="noStrike">
                 <a:solidFill>
                   <a:srgbClr val="000000"/>
@@ -14334,7 +14352,7 @@
                 <a:latin typeface="Times New Roman"/>
                 <a:ea typeface="DejaVu Sans"/>
               </a:rPr>
-              <a:t>&lt;number&gt;</a:t>
+              <a:t>1</a:t>
             </a:fld>
             <a:endParaRPr b="0" lang="en-US" sz="1600" spc="-1" strike="noStrike">
               <a:latin typeface="Arial"/>
@@ -14355,7 +14373,7 @@
         <p:spPr>
           <a:xfrm>
             <a:off x="556560" y="2194560"/>
-            <a:ext cx="2278080" cy="3749040"/>
+            <a:ext cx="2277720" cy="3748680"/>
           </a:xfrm>
           <a:prstGeom prst="rect">
             <a:avLst/>
@@ -14406,8 +14424,8 @@
         </p:nvSpPr>
         <p:spPr>
           <a:xfrm>
-            <a:off x="3428640" y="376920"/>
-            <a:ext cx="5697360" cy="524880"/>
+            <a:off x="685800" y="0"/>
+            <a:ext cx="10959840" cy="1132200"/>
           </a:xfrm>
           <a:prstGeom prst="rect">
             <a:avLst/>
@@ -14442,11 +14460,43 @@
                   <a:srgbClr val="3465a4"/>
                 </a:solidFill>
                 <a:latin typeface="Arial"/>
-                <a:ea typeface="DejaVu Sans"/>
-              </a:rPr>
-              <a:t>Questions and Answers</a:t>
-            </a:r>
-            <a:endParaRPr b="0" lang="en-US" sz="3200" spc="-1" strike="noStrike">
+                <a:ea typeface="Noto Sans CJK SC"/>
+              </a:rPr>
+              <a:t>3- Helm Chart</a:t>
+            </a:r>
+            <a:br/>
+            <a:br/>
+            <a:r>
+              <a:rPr b="1" lang="en-US" sz="1800" spc="-1" strike="noStrike">
+                <a:solidFill>
+                  <a:srgbClr val="000000"/>
+                </a:solidFill>
+                <a:latin typeface="Arial"/>
+                <a:ea typeface="DejaVu Sans"/>
+              </a:rPr>
+              <a:t>Dependencies</a:t>
+            </a:r>
+            <a:r>
+              <a:rPr b="0" lang="en-US" sz="1800" spc="-1" strike="noStrike">
+                <a:solidFill>
+                  <a:srgbClr val="000000"/>
+                </a:solidFill>
+                <a:latin typeface="Arial"/>
+                <a:ea typeface="DejaVu Sans"/>
+              </a:rPr>
+              <a:t> and resources</a:t>
+            </a:r>
+            <a:r>
+              <a:rPr b="0" lang="en-US" sz="2200" spc="-1" strike="noStrike">
+                <a:solidFill>
+                  <a:srgbClr val="000000"/>
+                </a:solidFill>
+                <a:latin typeface="Arial"/>
+                <a:ea typeface="Noto Sans CJK SC"/>
+              </a:rPr>
+              <a:t> - 1</a:t>
+            </a:r>
+            <a:endParaRPr b="0" lang="en-US" sz="2200" spc="-1" strike="noStrike">
               <a:latin typeface="Arial"/>
             </a:endParaRPr>
           </a:p>
@@ -14460,15 +14510,18 @@
         </p:nvSpPr>
         <p:spPr>
           <a:xfrm>
-            <a:off x="10515240" y="6202080"/>
-            <a:ext cx="1587600" cy="414720"/>
+            <a:off x="274320" y="1554480"/>
+            <a:ext cx="11063160" cy="4479480"/>
           </a:xfrm>
           <a:prstGeom prst="rect">
             <a:avLst/>
           </a:prstGeom>
           <a:noFill/>
-          <a:ln>
-            <a:noFill/>
+          <a:ln cap="rnd" w="6480">
+            <a:solidFill>
+              <a:srgbClr val="5eb91e"/>
+            </a:solidFill>
+            <a:round/>
           </a:ln>
         </p:spPr>
         <p:style>
@@ -14478,6 +14531,337 @@
           <a:fontRef idx="minor"/>
         </p:style>
         <p:txBody>
+          <a:bodyPr lIns="93240" rIns="93240" tIns="48240" bIns="48240">
+            <a:noAutofit/>
+          </a:bodyPr>
+          <a:p>
+            <a:pPr>
+              <a:lnSpc>
+                <a:spcPct val="100000"/>
+              </a:lnSpc>
+              <a:spcBef>
+                <a:spcPts val="1417"/>
+              </a:spcBef>
+            </a:pPr>
+            <a:r>
+              <a:rPr b="0" lang="en-US" sz="1800" spc="-1" strike="noStrike" u="sng">
+                <a:uFillTx/>
+                <a:latin typeface="Arial"/>
+                <a:ea typeface="DejaVu Sans"/>
+              </a:rPr>
+              <a:t>Definition</a:t>
+            </a:r>
+            <a:r>
+              <a:rPr b="0" lang="en-US" sz="1800" spc="-1" strike="noStrike">
+                <a:latin typeface="Arial"/>
+                <a:ea typeface="DejaVu Sans"/>
+              </a:rPr>
+              <a:t>: a feature of Helm that allows us to declare and manage external dependencies for a Helm chart.</a:t>
+            </a:r>
+            <a:endParaRPr b="0" lang="en-US" sz="1800" spc="-1" strike="noStrike">
+              <a:latin typeface="Arial"/>
+            </a:endParaRPr>
+          </a:p>
+          <a:p>
+            <a:pPr>
+              <a:lnSpc>
+                <a:spcPct val="100000"/>
+              </a:lnSpc>
+              <a:spcBef>
+                <a:spcPts val="1417"/>
+              </a:spcBef>
+            </a:pPr>
+            <a:r>
+              <a:rPr b="0" lang="en-US" sz="1800" spc="-1" strike="noStrike" u="sng">
+                <a:uFillTx/>
+                <a:latin typeface="Arial"/>
+                <a:ea typeface="DejaVu Sans"/>
+              </a:rPr>
+              <a:t>Main benefits</a:t>
+            </a:r>
+            <a:r>
+              <a:rPr b="0" lang="en-US" sz="1800" spc="-1" strike="noStrike">
+                <a:latin typeface="Arial"/>
+                <a:ea typeface="DejaVu Sans"/>
+              </a:rPr>
+              <a:t>: </a:t>
+            </a:r>
+            <a:br/>
+            <a:r>
+              <a:rPr b="0" lang="en-US" sz="1800" spc="-1" strike="noStrike">
+                <a:latin typeface="Arial"/>
+                <a:ea typeface="DejaVu Sans"/>
+              </a:rPr>
+              <a:t>- Simplified installation</a:t>
+            </a:r>
+            <a:br/>
+            <a:r>
+              <a:rPr b="0" lang="en-US" sz="1800" spc="-1" strike="noStrike">
+                <a:latin typeface="Arial"/>
+                <a:ea typeface="DejaVu Sans"/>
+              </a:rPr>
+              <a:t>- Easy version management</a:t>
+            </a:r>
+            <a:endParaRPr b="0" lang="en-US" sz="1800" spc="-1" strike="noStrike">
+              <a:latin typeface="Arial"/>
+            </a:endParaRPr>
+          </a:p>
+          <a:p>
+            <a:pPr>
+              <a:lnSpc>
+                <a:spcPct val="100000"/>
+              </a:lnSpc>
+              <a:spcBef>
+                <a:spcPts val="1417"/>
+              </a:spcBef>
+            </a:pPr>
+            <a:r>
+              <a:rPr b="0" lang="en-US" sz="1800" spc="-1" strike="noStrike" u="sng">
+                <a:uFillTx/>
+                <a:latin typeface="Arial"/>
+                <a:ea typeface="DejaVu Sans"/>
+              </a:rPr>
+              <a:t>Configuration</a:t>
+            </a:r>
+            <a:r>
+              <a:rPr b="0" lang="en-US" sz="1800" spc="-1" strike="noStrike">
+                <a:latin typeface="Arial"/>
+                <a:ea typeface="DejaVu Sans"/>
+              </a:rPr>
+              <a:t>: In “Chart.yaml”, we define name, version and repository for a chart as in</a:t>
+            </a:r>
+            <a:br/>
+            <a:r>
+              <a:rPr b="0" lang="en-US" sz="1800" spc="-1" strike="noStrike">
+                <a:solidFill>
+                  <a:srgbClr val="c9211e"/>
+                </a:solidFill>
+                <a:latin typeface="Arial"/>
+                <a:ea typeface="DejaVu Sans"/>
+              </a:rPr>
+              <a:t>Dependencies</a:t>
+            </a:r>
+            <a:r>
+              <a:rPr b="0" lang="en-US" sz="1800" spc="-1" strike="noStrike">
+                <a:latin typeface="Arial"/>
+                <a:ea typeface="DejaVu Sans"/>
+              </a:rPr>
+              <a:t>:</a:t>
+            </a:r>
+            <a:br/>
+            <a:r>
+              <a:rPr b="0" lang="en-US" sz="1800" spc="-1" strike="noStrike">
+                <a:latin typeface="Arial"/>
+                <a:ea typeface="DejaVu Sans"/>
+              </a:rPr>
+              <a:t> - </a:t>
+            </a:r>
+            <a:r>
+              <a:rPr b="0" lang="en-US" sz="1800" spc="-1" strike="noStrike">
+                <a:solidFill>
+                  <a:srgbClr val="c9211e"/>
+                </a:solidFill>
+                <a:latin typeface="Arial"/>
+                <a:ea typeface="DejaVu Sans"/>
+              </a:rPr>
+              <a:t>name</a:t>
+            </a:r>
+            <a:r>
+              <a:rPr b="0" lang="en-US" sz="1800" spc="-1" strike="noStrike">
+                <a:latin typeface="Arial"/>
+                <a:ea typeface="DejaVu Sans"/>
+              </a:rPr>
+              <a:t>: </a:t>
+            </a:r>
+            <a:r>
+              <a:rPr b="0" lang="en-US" sz="1800" spc="-1" strike="noStrike">
+                <a:solidFill>
+                  <a:srgbClr val="00a933"/>
+                </a:solidFill>
+                <a:latin typeface="Arial"/>
+                <a:ea typeface="DejaVu Sans"/>
+              </a:rPr>
+              <a:t>ingress-nginx</a:t>
+            </a:r>
+            <a:br/>
+            <a:r>
+              <a:rPr b="0" lang="en-US" sz="1800" spc="-1" strike="noStrike">
+                <a:latin typeface="Arial"/>
+                <a:ea typeface="DejaVu Sans"/>
+              </a:rPr>
+              <a:t>   </a:t>
+            </a:r>
+            <a:r>
+              <a:rPr b="0" lang="en-US" sz="1800" spc="-1" strike="noStrike">
+                <a:solidFill>
+                  <a:srgbClr val="c9211e"/>
+                </a:solidFill>
+                <a:latin typeface="Arial"/>
+                <a:ea typeface="DejaVu Sans"/>
+              </a:rPr>
+              <a:t>version</a:t>
+            </a:r>
+            <a:r>
+              <a:rPr b="0" lang="en-US" sz="1800" spc="-1" strike="noStrike">
+                <a:latin typeface="Arial"/>
+                <a:ea typeface="DejaVu Sans"/>
+              </a:rPr>
+              <a:t>: </a:t>
+            </a:r>
+            <a:r>
+              <a:rPr b="0" lang="en-US" sz="1800" spc="-1" strike="noStrike">
+                <a:solidFill>
+                  <a:srgbClr val="00a933"/>
+                </a:solidFill>
+                <a:latin typeface="Arial"/>
+                <a:ea typeface="DejaVu Sans"/>
+              </a:rPr>
+              <a:t>4.6.1</a:t>
+            </a:r>
+            <a:br/>
+            <a:r>
+              <a:rPr b="0" lang="en-US" sz="1800" spc="-1" strike="noStrike">
+                <a:latin typeface="Arial"/>
+                <a:ea typeface="DejaVu Sans"/>
+              </a:rPr>
+              <a:t>   </a:t>
+            </a:r>
+            <a:r>
+              <a:rPr b="0" lang="en-US" sz="1800" spc="-1" strike="noStrike">
+                <a:solidFill>
+                  <a:srgbClr val="c9211e"/>
+                </a:solidFill>
+                <a:latin typeface="Arial"/>
+                <a:ea typeface="DejaVu Sans"/>
+              </a:rPr>
+              <a:t>repository</a:t>
+            </a:r>
+            <a:r>
+              <a:rPr b="0" lang="en-US" sz="1800" spc="-1" strike="noStrike">
+                <a:latin typeface="Arial"/>
+                <a:ea typeface="DejaVu Sans"/>
+              </a:rPr>
+              <a:t>: </a:t>
+            </a:r>
+            <a:r>
+              <a:rPr b="0" lang="en-US" sz="1800" spc="-1" strike="noStrike">
+                <a:solidFill>
+                  <a:srgbClr val="00a933"/>
+                </a:solidFill>
+                <a:latin typeface="Arial"/>
+                <a:ea typeface="DejaVu Sans"/>
+              </a:rPr>
+              <a:t>https://kubernetes.github.io/ingress-nginx</a:t>
+            </a:r>
+            <a:endParaRPr b="0" lang="en-US" sz="1800" spc="-1" strike="noStrike">
+              <a:latin typeface="Arial"/>
+            </a:endParaRPr>
+          </a:p>
+          <a:p>
+            <a:pPr>
+              <a:lnSpc>
+                <a:spcPct val="100000"/>
+              </a:lnSpc>
+              <a:spcBef>
+                <a:spcPts val="1417"/>
+              </a:spcBef>
+            </a:pPr>
+            <a:r>
+              <a:rPr b="0" lang="en-US" sz="1800" spc="-1" strike="noStrike" u="sng">
+                <a:uFillTx/>
+                <a:latin typeface="Arial"/>
+                <a:ea typeface="DejaVu Sans"/>
+              </a:rPr>
+              <a:t>Commands</a:t>
+            </a:r>
+            <a:r>
+              <a:rPr b="0" lang="en-US" sz="1800" spc="-1" strike="noStrike">
+                <a:latin typeface="Arial"/>
+                <a:ea typeface="DejaVu Sans"/>
+              </a:rPr>
+              <a:t>: </a:t>
+            </a:r>
+            <a:r>
+              <a:rPr b="0" i="1" lang="en-US" sz="1800" spc="-1" strike="noStrike">
+                <a:solidFill>
+                  <a:srgbClr val="c9211e"/>
+                </a:solidFill>
+                <a:latin typeface="Arial"/>
+                <a:ea typeface="DejaVu Sans"/>
+              </a:rPr>
+              <a:t>helm</a:t>
+            </a:r>
+            <a:r>
+              <a:rPr b="0" i="1" lang="en-US" sz="1800" spc="-1" strike="noStrike">
+                <a:latin typeface="Arial"/>
+                <a:ea typeface="DejaVu Sans"/>
+              </a:rPr>
+              <a:t> </a:t>
+            </a:r>
+            <a:r>
+              <a:rPr b="0" i="1" lang="en-US" sz="1800" spc="-1" strike="noStrike">
+                <a:solidFill>
+                  <a:srgbClr val="00a933"/>
+                </a:solidFill>
+                <a:latin typeface="Arial"/>
+                <a:ea typeface="DejaVu Sans"/>
+              </a:rPr>
+              <a:t>dependency</a:t>
+            </a:r>
+            <a:r>
+              <a:rPr b="0" i="1" lang="en-US" sz="1800" spc="-1" strike="noStrike">
+                <a:latin typeface="Arial"/>
+                <a:ea typeface="DejaVu Sans"/>
+              </a:rPr>
+              <a:t> update</a:t>
+            </a:r>
+            <a:br/>
+            <a:endParaRPr b="0" lang="en-US" sz="1800" spc="-1" strike="noStrike">
+              <a:latin typeface="Arial"/>
+            </a:endParaRPr>
+          </a:p>
+          <a:p>
+            <a:pPr>
+              <a:lnSpc>
+                <a:spcPct val="100000"/>
+              </a:lnSpc>
+              <a:spcBef>
+                <a:spcPts val="1417"/>
+              </a:spcBef>
+            </a:pPr>
+            <a:br/>
+            <a:endParaRPr b="0" lang="en-US" sz="1800" spc="-1" strike="noStrike">
+              <a:latin typeface="Arial"/>
+            </a:endParaRPr>
+          </a:p>
+        </p:txBody>
+      </p:sp>
+      <p:sp>
+        <p:nvSpPr>
+          <p:cNvPr id="291" name="CustomShape 3"/>
+          <p:cNvSpPr/>
+          <p:nvPr/>
+        </p:nvSpPr>
+        <p:spPr>
+          <a:xfrm>
+            <a:off x="10515240" y="6202080"/>
+            <a:ext cx="1587240" cy="414360"/>
+          </a:xfrm>
+          <a:prstGeom prst="rect">
+            <a:avLst/>
+          </a:prstGeom>
+          <a:noFill/>
+          <a:ln>
+            <a:noFill/>
+          </a:ln>
+        </p:spPr>
+        <p:style>
+          <a:lnRef idx="0"/>
+          <a:fillRef idx="0"/>
+          <a:effectRef idx="0"/>
+          <a:fontRef idx="minor"/>
+        </p:style>
+        <p:txBody>
           <a:bodyPr lIns="90000" rIns="90000" tIns="45000" bIns="45000">
             <a:noAutofit/>
           </a:bodyPr>
@@ -14487,7 +14871,7 @@
                 <a:spcPct val="100000"/>
               </a:lnSpc>
             </a:pPr>
-            <a:fld id="{2BDDBFA5-EC7C-421C-B451-E2CCE8EC182A}" type="slidenum">
+            <a:fld id="{A6FE48D2-81FF-4258-9FDF-8AADEA67D018}" type="slidenum">
               <a:rPr b="0" lang="en-US" sz="1600" spc="-1" strike="noStrike">
                 <a:solidFill>
                   <a:srgbClr val="000000"/>
@@ -14505,7 +14889,7 @@
       </p:sp>
       <p:pic>
         <p:nvPicPr>
-          <p:cNvPr id="291" name="Picture 412" descr=""/>
+          <p:cNvPr id="292" name="" descr=""/>
           <p:cNvPicPr/>
           <p:nvPr/>
         </p:nvPicPr>
@@ -14515,8 +14899,8 @@
         </p:blipFill>
         <p:spPr>
           <a:xfrm>
-            <a:off x="4114440" y="2105280"/>
-            <a:ext cx="4637160" cy="3141720"/>
+            <a:off x="404640" y="4872600"/>
+            <a:ext cx="6752880" cy="1113480"/>
           </a:xfrm>
           <a:prstGeom prst="rect">
             <a:avLst/>
@@ -14556,6 +14940,1789 @@
           <a:chExt cx="0" cy="0"/>
         </a:xfrm>
       </p:grpSpPr>
+      <p:sp>
+        <p:nvSpPr>
+          <p:cNvPr id="293" name="CustomShape 1"/>
+          <p:cNvSpPr/>
+          <p:nvPr/>
+        </p:nvSpPr>
+        <p:spPr>
+          <a:xfrm>
+            <a:off x="685800" y="0"/>
+            <a:ext cx="10959840" cy="1132200"/>
+          </a:xfrm>
+          <a:prstGeom prst="rect">
+            <a:avLst/>
+          </a:prstGeom>
+          <a:noFill/>
+          <a:ln>
+            <a:noFill/>
+          </a:ln>
+        </p:spPr>
+        <p:style>
+          <a:lnRef idx="0"/>
+          <a:fillRef idx="0"/>
+          <a:effectRef idx="0"/>
+          <a:fontRef idx="minor"/>
+        </p:style>
+        <p:txBody>
+          <a:bodyPr lIns="90000" rIns="90000" tIns="45000" bIns="45000">
+            <a:noAutofit/>
+          </a:bodyPr>
+          <a:p>
+            <a:pPr algn="ctr">
+              <a:lnSpc>
+                <a:spcPct val="90000"/>
+              </a:lnSpc>
+              <a:spcBef>
+                <a:spcPts val="1001"/>
+              </a:spcBef>
+            </a:pPr>
+            <a:r>
+              <a:rPr b="1" lang="en-US" sz="3200" spc="-1" strike="noStrike">
+                <a:solidFill>
+                  <a:srgbClr val="3465a4"/>
+                </a:solidFill>
+                <a:latin typeface="Arial"/>
+                <a:ea typeface="Noto Sans CJK SC"/>
+              </a:rPr>
+              <a:t>3- Helm Chart</a:t>
+            </a:r>
+            <a:br/>
+            <a:br/>
+            <a:r>
+              <a:rPr b="0" lang="en-US" sz="1800" spc="-1" strike="noStrike">
+                <a:solidFill>
+                  <a:srgbClr val="000000"/>
+                </a:solidFill>
+                <a:latin typeface="Arial"/>
+                <a:ea typeface="DejaVu Sans"/>
+              </a:rPr>
+              <a:t>Dependencies and </a:t>
+            </a:r>
+            <a:r>
+              <a:rPr b="1" lang="en-US" sz="1800" spc="-1" strike="noStrike">
+                <a:solidFill>
+                  <a:srgbClr val="000000"/>
+                </a:solidFill>
+                <a:latin typeface="Arial"/>
+                <a:ea typeface="DejaVu Sans"/>
+              </a:rPr>
+              <a:t>resources</a:t>
+            </a:r>
+            <a:r>
+              <a:rPr b="0" lang="en-US" sz="2200" spc="-1" strike="noStrike">
+                <a:solidFill>
+                  <a:srgbClr val="000000"/>
+                </a:solidFill>
+                <a:latin typeface="Arial"/>
+                <a:ea typeface="Noto Sans CJK SC"/>
+              </a:rPr>
+              <a:t> - 2</a:t>
+            </a:r>
+            <a:endParaRPr b="0" lang="en-US" sz="2200" spc="-1" strike="noStrike">
+              <a:latin typeface="Arial"/>
+            </a:endParaRPr>
+          </a:p>
+        </p:txBody>
+      </p:sp>
+      <p:sp>
+        <p:nvSpPr>
+          <p:cNvPr id="294" name="CustomShape 2"/>
+          <p:cNvSpPr/>
+          <p:nvPr/>
+        </p:nvSpPr>
+        <p:spPr>
+          <a:xfrm>
+            <a:off x="274320" y="1554480"/>
+            <a:ext cx="11063160" cy="4479480"/>
+          </a:xfrm>
+          <a:prstGeom prst="rect">
+            <a:avLst/>
+          </a:prstGeom>
+          <a:noFill/>
+          <a:ln cap="rnd" w="6480">
+            <a:solidFill>
+              <a:srgbClr val="5eb91e"/>
+            </a:solidFill>
+            <a:round/>
+          </a:ln>
+        </p:spPr>
+        <p:style>
+          <a:lnRef idx="0"/>
+          <a:fillRef idx="0"/>
+          <a:effectRef idx="0"/>
+          <a:fontRef idx="minor"/>
+        </p:style>
+        <p:txBody>
+          <a:bodyPr lIns="93240" rIns="93240" tIns="48240" bIns="48240">
+            <a:noAutofit/>
+          </a:bodyPr>
+          <a:p>
+            <a:pPr>
+              <a:lnSpc>
+                <a:spcPct val="100000"/>
+              </a:lnSpc>
+              <a:spcBef>
+                <a:spcPts val="1417"/>
+              </a:spcBef>
+            </a:pPr>
+            <a:r>
+              <a:rPr b="0" lang="en-US" sz="1800" spc="-1" strike="noStrike" u="sng">
+                <a:uFillTx/>
+                <a:latin typeface="Arial"/>
+                <a:ea typeface="DejaVu Sans"/>
+              </a:rPr>
+              <a:t>Definition</a:t>
+            </a:r>
+            <a:r>
+              <a:rPr b="0" lang="en-US" sz="1800" spc="-1" strike="noStrike">
+                <a:latin typeface="Arial"/>
+                <a:ea typeface="DejaVu Sans"/>
+              </a:rPr>
+              <a:t>: specify Kubernetes resources that should be created, managed, or updated.</a:t>
+            </a:r>
+            <a:endParaRPr b="0" lang="en-US" sz="1800" spc="-1" strike="noStrike">
+              <a:latin typeface="Arial"/>
+            </a:endParaRPr>
+          </a:p>
+          <a:p>
+            <a:pPr>
+              <a:lnSpc>
+                <a:spcPct val="100000"/>
+              </a:lnSpc>
+              <a:spcBef>
+                <a:spcPts val="1417"/>
+              </a:spcBef>
+            </a:pPr>
+            <a:r>
+              <a:rPr b="0" lang="en-US" sz="1800" spc="-1" strike="noStrike" u="sng">
+                <a:uFillTx/>
+                <a:latin typeface="Arial"/>
+                <a:ea typeface="DejaVu Sans"/>
+              </a:rPr>
+              <a:t>Configuration</a:t>
+            </a:r>
+            <a:r>
+              <a:rPr b="0" lang="en-US" sz="1800" spc="-1" strike="noStrike">
+                <a:latin typeface="Arial"/>
+                <a:ea typeface="DejaVu Sans"/>
+              </a:rPr>
+              <a:t>: In “</a:t>
+            </a:r>
+            <a:r>
+              <a:rPr b="0" lang="en-US" sz="1800" spc="-1" strike="noStrike">
+                <a:solidFill>
+                  <a:srgbClr val="00a933"/>
+                </a:solidFill>
+                <a:latin typeface="Arial"/>
+                <a:ea typeface="DejaVu Sans"/>
+              </a:rPr>
+              <a:t>Chart.yaml</a:t>
+            </a:r>
+            <a:r>
+              <a:rPr b="0" lang="en-US" sz="1800" spc="-1" strike="noStrike">
+                <a:latin typeface="Arial"/>
+                <a:ea typeface="DejaVu Sans"/>
+              </a:rPr>
+              <a:t>”, we typically define </a:t>
+            </a:r>
+            <a:r>
+              <a:rPr b="0" lang="en-US" sz="1800" spc="-1" strike="noStrike">
+                <a:solidFill>
+                  <a:srgbClr val="c9211e"/>
+                </a:solidFill>
+                <a:latin typeface="Arial"/>
+                <a:ea typeface="DejaVu Sans"/>
+              </a:rPr>
+              <a:t>kind</a:t>
+            </a:r>
+            <a:r>
+              <a:rPr b="0" lang="en-US" sz="1800" spc="-1" strike="noStrike">
+                <a:latin typeface="Arial"/>
+                <a:ea typeface="DejaVu Sans"/>
+              </a:rPr>
+              <a:t>, </a:t>
+            </a:r>
+            <a:r>
+              <a:rPr b="0" lang="en-US" sz="1800" spc="-1" strike="noStrike">
+                <a:solidFill>
+                  <a:srgbClr val="c9211e"/>
+                </a:solidFill>
+                <a:latin typeface="Arial"/>
+                <a:ea typeface="DejaVu Sans"/>
+              </a:rPr>
+              <a:t>name</a:t>
+            </a:r>
+            <a:r>
+              <a:rPr b="0" lang="en-US" sz="1800" spc="-1" strike="noStrike">
+                <a:latin typeface="Arial"/>
+                <a:ea typeface="DejaVu Sans"/>
+              </a:rPr>
+              <a:t> for selections as in</a:t>
+            </a:r>
+            <a:br/>
+            <a:r>
+              <a:rPr b="0" lang="en-US" sz="1800" spc="-1" strike="noStrike">
+                <a:solidFill>
+                  <a:srgbClr val="c9211e"/>
+                </a:solidFill>
+                <a:latin typeface="Arial"/>
+                <a:ea typeface="DejaVu Sans"/>
+              </a:rPr>
+              <a:t>resources</a:t>
+            </a:r>
+            <a:r>
+              <a:rPr b="0" lang="en-US" sz="1800" spc="-1" strike="noStrike">
+                <a:latin typeface="Arial"/>
+                <a:ea typeface="DejaVu Sans"/>
+              </a:rPr>
+              <a:t>:</a:t>
+            </a:r>
+            <a:br/>
+            <a:r>
+              <a:rPr b="0" lang="en-US" sz="1800" spc="-1" strike="noStrike">
+                <a:latin typeface="Arial"/>
+                <a:ea typeface="DejaVu Sans"/>
+              </a:rPr>
+              <a:t>  - </a:t>
+            </a:r>
+            <a:r>
+              <a:rPr b="0" lang="en-US" sz="1800" spc="-1" strike="noStrike">
+                <a:solidFill>
+                  <a:srgbClr val="c9211e"/>
+                </a:solidFill>
+                <a:latin typeface="Arial"/>
+                <a:ea typeface="DejaVu Sans"/>
+              </a:rPr>
+              <a:t>kind</a:t>
+            </a:r>
+            <a:r>
+              <a:rPr b="0" lang="en-US" sz="1800" spc="-1" strike="noStrike">
+                <a:latin typeface="Arial"/>
+                <a:ea typeface="DejaVu Sans"/>
+              </a:rPr>
+              <a:t>: </a:t>
+            </a:r>
+            <a:r>
+              <a:rPr b="0" lang="en-US" sz="1800" spc="-1" strike="noStrike">
+                <a:solidFill>
+                  <a:srgbClr val="00a933"/>
+                </a:solidFill>
+                <a:latin typeface="Arial"/>
+                <a:ea typeface="DejaVu Sans"/>
+              </a:rPr>
+              <a:t>Deployment</a:t>
+            </a:r>
+            <a:br/>
+            <a:r>
+              <a:rPr b="0" lang="en-US" sz="1800" spc="-1" strike="noStrike">
+                <a:latin typeface="Arial"/>
+                <a:ea typeface="DejaVu Sans"/>
+              </a:rPr>
+              <a:t>    </a:t>
+            </a:r>
+            <a:r>
+              <a:rPr b="0" lang="en-US" sz="1800" spc="-1" strike="noStrike">
+                <a:solidFill>
+                  <a:srgbClr val="c9211e"/>
+                </a:solidFill>
+                <a:latin typeface="Arial"/>
+                <a:ea typeface="DejaVu Sans"/>
+              </a:rPr>
+              <a:t>name</a:t>
+            </a:r>
+            <a:r>
+              <a:rPr b="0" lang="en-US" sz="1800" spc="-1" strike="noStrike">
+                <a:latin typeface="Arial"/>
+                <a:ea typeface="DejaVu Sans"/>
+              </a:rPr>
+              <a:t>: </a:t>
+            </a:r>
+            <a:r>
+              <a:rPr b="0" lang="en-US" sz="1800" spc="-1" strike="noStrike">
+                <a:solidFill>
+                  <a:srgbClr val="00a933"/>
+                </a:solidFill>
+                <a:latin typeface="Arial"/>
+                <a:ea typeface="DejaVu Sans"/>
+              </a:rPr>
+              <a:t>frontend</a:t>
+            </a:r>
+            <a:endParaRPr b="0" lang="en-US" sz="1800" spc="-1" strike="noStrike">
+              <a:latin typeface="Arial"/>
+            </a:endParaRPr>
+          </a:p>
+          <a:p>
+            <a:pPr>
+              <a:lnSpc>
+                <a:spcPct val="100000"/>
+              </a:lnSpc>
+              <a:spcBef>
+                <a:spcPts val="1417"/>
+              </a:spcBef>
+            </a:pPr>
+            <a:endParaRPr b="0" lang="en-US" sz="1800" spc="-1" strike="noStrike">
+              <a:latin typeface="Arial"/>
+            </a:endParaRPr>
+          </a:p>
+        </p:txBody>
+      </p:sp>
+      <p:sp>
+        <p:nvSpPr>
+          <p:cNvPr id="295" name="CustomShape 3"/>
+          <p:cNvSpPr/>
+          <p:nvPr/>
+        </p:nvSpPr>
+        <p:spPr>
+          <a:xfrm>
+            <a:off x="10515240" y="6202080"/>
+            <a:ext cx="1587240" cy="414360"/>
+          </a:xfrm>
+          <a:prstGeom prst="rect">
+            <a:avLst/>
+          </a:prstGeom>
+          <a:noFill/>
+          <a:ln>
+            <a:noFill/>
+          </a:ln>
+        </p:spPr>
+        <p:style>
+          <a:lnRef idx="0"/>
+          <a:fillRef idx="0"/>
+          <a:effectRef idx="0"/>
+          <a:fontRef idx="minor"/>
+        </p:style>
+        <p:txBody>
+          <a:bodyPr lIns="90000" rIns="90000" tIns="45000" bIns="45000">
+            <a:noAutofit/>
+          </a:bodyPr>
+          <a:p>
+            <a:pPr algn="ctr">
+              <a:lnSpc>
+                <a:spcPct val="100000"/>
+              </a:lnSpc>
+            </a:pPr>
+            <a:fld id="{5BB74FE7-14B8-4DF2-9F77-C87A8493DA01}" type="slidenum">
+              <a:rPr b="0" lang="en-US" sz="1600" spc="-1" strike="noStrike">
+                <a:solidFill>
+                  <a:srgbClr val="000000"/>
+                </a:solidFill>
+                <a:latin typeface="Times New Roman"/>
+                <a:ea typeface="DejaVu Sans"/>
+              </a:rPr>
+              <a:t>&lt;number&gt;</a:t>
+            </a:fld>
+            <a:endParaRPr b="0" lang="en-US" sz="1600" spc="-1" strike="noStrike">
+              <a:latin typeface="Arial"/>
+            </a:endParaRPr>
+          </a:p>
+        </p:txBody>
+      </p:sp>
+    </p:spTree>
+  </p:cSld>
+  <mc:AlternateContent>
+    <mc:Choice Requires="p14">
+      <p:transition spd="slow" p14:dur="2000"/>
+    </mc:Choice>
+    <mc:Fallback>
+      <p:transition spd="slow"/>
+    </mc:Fallback>
+  </mc:AlternateContent>
+</p:sld>
+</file>
+
+<file path=ppt/slides/slide26.xml><?xml version="1.0" encoding="utf-8"?>
+<p:sld xmlns:a="http://schemas.openxmlformats.org/drawingml/2006/main" xmlns:p="http://schemas.openxmlformats.org/presentationml/2006/main" xmlns:r="http://schemas.openxmlformats.org/officeDocument/2006/relationships" xmlns:p14="http://schemas.microsoft.com/office/powerpoint/2010/main" xmlns:p15="http://schemas.microsoft.com/office/powerpoint/2012/main" xmlns:mc="http://schemas.openxmlformats.org/markup-compatibility/2006">
+  <p:cSld>
+    <p:spTree>
+      <p:nvGrpSpPr>
+        <p:cNvPr id="1" name=""/>
+        <p:cNvGrpSpPr/>
+        <p:nvPr/>
+      </p:nvGrpSpPr>
+      <p:grpSpPr>
+        <a:xfrm>
+          <a:off x="0" y="0"/>
+          <a:ext cx="0" cy="0"/>
+          <a:chOff x="0" y="0"/>
+          <a:chExt cx="0" cy="0"/>
+        </a:xfrm>
+      </p:grpSpPr>
+      <p:sp>
+        <p:nvSpPr>
+          <p:cNvPr id="296" name="CustomShape 1"/>
+          <p:cNvSpPr/>
+          <p:nvPr/>
+        </p:nvSpPr>
+        <p:spPr>
+          <a:xfrm>
+            <a:off x="685800" y="0"/>
+            <a:ext cx="10959840" cy="1132200"/>
+          </a:xfrm>
+          <a:prstGeom prst="rect">
+            <a:avLst/>
+          </a:prstGeom>
+          <a:noFill/>
+          <a:ln>
+            <a:noFill/>
+          </a:ln>
+        </p:spPr>
+        <p:style>
+          <a:lnRef idx="0"/>
+          <a:fillRef idx="0"/>
+          <a:effectRef idx="0"/>
+          <a:fontRef idx="minor"/>
+        </p:style>
+        <p:txBody>
+          <a:bodyPr lIns="90000" rIns="90000" tIns="45000" bIns="45000">
+            <a:noAutofit/>
+          </a:bodyPr>
+          <a:p>
+            <a:pPr algn="ctr">
+              <a:lnSpc>
+                <a:spcPct val="90000"/>
+              </a:lnSpc>
+              <a:spcBef>
+                <a:spcPts val="1001"/>
+              </a:spcBef>
+            </a:pPr>
+            <a:r>
+              <a:rPr b="1" lang="en-US" sz="3200" spc="-1" strike="noStrike">
+                <a:solidFill>
+                  <a:srgbClr val="3465a4"/>
+                </a:solidFill>
+                <a:latin typeface="Arial"/>
+                <a:ea typeface="Noto Sans CJK SC"/>
+              </a:rPr>
+              <a:t>3- Helm Chart</a:t>
+            </a:r>
+            <a:br/>
+            <a:br/>
+            <a:r>
+              <a:rPr b="1" lang="en-US" sz="1800" spc="-1" strike="noStrike">
+                <a:solidFill>
+                  <a:srgbClr val="000000"/>
+                </a:solidFill>
+                <a:latin typeface="Arial"/>
+                <a:ea typeface="DejaVu Sans"/>
+              </a:rPr>
+              <a:t>Conditional statements</a:t>
+            </a:r>
+            <a:r>
+              <a:rPr b="0" lang="en-US" sz="1800" spc="-1" strike="noStrike">
+                <a:solidFill>
+                  <a:srgbClr val="000000"/>
+                </a:solidFill>
+                <a:latin typeface="Arial"/>
+                <a:ea typeface="DejaVu Sans"/>
+              </a:rPr>
+              <a:t> and loops</a:t>
+            </a:r>
+            <a:r>
+              <a:rPr b="0" lang="en-US" sz="2200" spc="-1" strike="noStrike">
+                <a:solidFill>
+                  <a:srgbClr val="000000"/>
+                </a:solidFill>
+                <a:latin typeface="Arial"/>
+                <a:ea typeface="Noto Sans CJK SC"/>
+              </a:rPr>
+              <a:t> - 1</a:t>
+            </a:r>
+            <a:endParaRPr b="0" lang="en-US" sz="2200" spc="-1" strike="noStrike">
+              <a:latin typeface="Arial"/>
+            </a:endParaRPr>
+          </a:p>
+        </p:txBody>
+      </p:sp>
+      <p:sp>
+        <p:nvSpPr>
+          <p:cNvPr id="297" name="CustomShape 2"/>
+          <p:cNvSpPr/>
+          <p:nvPr/>
+        </p:nvSpPr>
+        <p:spPr>
+          <a:xfrm>
+            <a:off x="274320" y="1554480"/>
+            <a:ext cx="11063160" cy="4479480"/>
+          </a:xfrm>
+          <a:prstGeom prst="rect">
+            <a:avLst/>
+          </a:prstGeom>
+          <a:noFill/>
+          <a:ln cap="rnd" w="6480">
+            <a:solidFill>
+              <a:srgbClr val="5eb91e"/>
+            </a:solidFill>
+            <a:round/>
+          </a:ln>
+        </p:spPr>
+        <p:style>
+          <a:lnRef idx="0"/>
+          <a:fillRef idx="0"/>
+          <a:effectRef idx="0"/>
+          <a:fontRef idx="minor"/>
+        </p:style>
+        <p:txBody>
+          <a:bodyPr lIns="93240" rIns="93240" tIns="48240" bIns="48240">
+            <a:noAutofit/>
+          </a:bodyPr>
+          <a:p>
+            <a:pPr>
+              <a:lnSpc>
+                <a:spcPct val="100000"/>
+              </a:lnSpc>
+              <a:spcBef>
+                <a:spcPts val="1417"/>
+              </a:spcBef>
+            </a:pPr>
+            <a:r>
+              <a:rPr b="0" lang="en-US" sz="1800" spc="-1" strike="noStrike" u="sng">
+                <a:uFillTx/>
+                <a:latin typeface="Arial"/>
+                <a:ea typeface="DejaVu Sans"/>
+              </a:rPr>
+              <a:t>Definition</a:t>
+            </a:r>
+            <a:r>
+              <a:rPr b="0" lang="en-US" sz="1800" spc="-1" strike="noStrike">
+                <a:latin typeface="Arial"/>
+                <a:ea typeface="DejaVu Sans"/>
+              </a:rPr>
+              <a:t>: control the flow and behavior of Helm templates based on specific conditions or values. They include </a:t>
+            </a:r>
+            <a:r>
+              <a:rPr b="0" lang="en-US" sz="1800" spc="-1" strike="noStrike">
+                <a:solidFill>
+                  <a:srgbClr val="c9211e"/>
+                </a:solidFill>
+                <a:latin typeface="Arial"/>
+                <a:ea typeface="DejaVu Sans"/>
+              </a:rPr>
+              <a:t>if</a:t>
+            </a:r>
+            <a:r>
+              <a:rPr b="0" lang="en-US" sz="1800" spc="-1" strike="noStrike">
+                <a:latin typeface="Arial"/>
+                <a:ea typeface="DejaVu Sans"/>
+              </a:rPr>
+              <a:t>, </a:t>
+            </a:r>
+            <a:r>
+              <a:rPr b="0" lang="en-US" sz="1800" spc="-1" strike="noStrike">
+                <a:solidFill>
+                  <a:srgbClr val="c9211e"/>
+                </a:solidFill>
+                <a:latin typeface="Arial"/>
+                <a:ea typeface="DejaVu Sans"/>
+              </a:rPr>
+              <a:t>else</a:t>
+            </a:r>
+            <a:r>
+              <a:rPr b="0" lang="en-US" sz="1800" spc="-1" strike="noStrike">
+                <a:latin typeface="Arial"/>
+                <a:ea typeface="DejaVu Sans"/>
+              </a:rPr>
+              <a:t>, and </a:t>
+            </a:r>
+            <a:r>
+              <a:rPr b="0" lang="en-US" sz="1800" spc="-1" strike="noStrike">
+                <a:solidFill>
+                  <a:srgbClr val="c9211e"/>
+                </a:solidFill>
+                <a:latin typeface="Arial"/>
+                <a:ea typeface="DejaVu Sans"/>
+              </a:rPr>
+              <a:t>with</a:t>
+            </a:r>
+            <a:r>
+              <a:rPr b="0" lang="en-US" sz="1800" spc="-1" strike="noStrike">
+                <a:latin typeface="Arial"/>
+                <a:ea typeface="DejaVu Sans"/>
+              </a:rPr>
+              <a:t> statements.</a:t>
+            </a:r>
+            <a:endParaRPr b="0" lang="en-US" sz="1800" spc="-1" strike="noStrike">
+              <a:latin typeface="Arial"/>
+            </a:endParaRPr>
+          </a:p>
+          <a:p>
+            <a:pPr>
+              <a:lnSpc>
+                <a:spcPct val="100000"/>
+              </a:lnSpc>
+              <a:spcBef>
+                <a:spcPts val="1417"/>
+              </a:spcBef>
+            </a:pPr>
+            <a:r>
+              <a:rPr b="0" lang="en-US" sz="1800" spc="-1" strike="noStrike" u="sng">
+                <a:uFillTx/>
+                <a:latin typeface="Arial"/>
+                <a:ea typeface="DejaVu Sans"/>
+              </a:rPr>
+              <a:t>Exampe</a:t>
+            </a:r>
+            <a:r>
+              <a:rPr b="0" lang="en-US" sz="1800" spc="-1" strike="noStrike">
+                <a:latin typeface="Arial"/>
+                <a:ea typeface="DejaVu Sans"/>
+              </a:rPr>
+              <a:t>: </a:t>
+            </a:r>
+            <a:br/>
+            <a:r>
+              <a:rPr b="0" lang="en-US" sz="1800" spc="-1" strike="noStrike">
+                <a:latin typeface="Arial"/>
+                <a:ea typeface="DejaVu Sans"/>
+              </a:rPr>
+              <a:t>In “</a:t>
+            </a:r>
+            <a:r>
+              <a:rPr b="0" lang="en-US" sz="1800" spc="-1" strike="noStrike">
+                <a:solidFill>
+                  <a:srgbClr val="c9211e"/>
+                </a:solidFill>
+                <a:latin typeface="Arial"/>
+                <a:ea typeface="DejaVu Sans"/>
+              </a:rPr>
+              <a:t>values.yaml</a:t>
+            </a:r>
+            <a:r>
+              <a:rPr b="0" lang="en-US" sz="1800" spc="-1" strike="noStrike">
+                <a:latin typeface="Arial"/>
+                <a:ea typeface="DejaVu Sans"/>
+              </a:rPr>
+              <a:t>”</a:t>
+            </a:r>
+            <a:br/>
+            <a:r>
+              <a:rPr b="0" lang="en-US" sz="1800" spc="-1" strike="noStrike">
+                <a:solidFill>
+                  <a:srgbClr val="00a933"/>
+                </a:solidFill>
+                <a:latin typeface="Arial"/>
+                <a:ea typeface="DejaVu Sans"/>
+              </a:rPr>
+              <a:t>createService: true</a:t>
+            </a:r>
+            <a:endParaRPr b="0" lang="en-US" sz="1800" spc="-1" strike="noStrike">
+              <a:latin typeface="Arial"/>
+            </a:endParaRPr>
+          </a:p>
+          <a:p>
+            <a:pPr>
+              <a:lnSpc>
+                <a:spcPct val="100000"/>
+              </a:lnSpc>
+              <a:spcBef>
+                <a:spcPts val="1417"/>
+              </a:spcBef>
+            </a:pPr>
+            <a:r>
+              <a:rPr b="0" lang="en-US" sz="1800" spc="-1" strike="noStrike">
+                <a:solidFill>
+                  <a:srgbClr val="000000"/>
+                </a:solidFill>
+                <a:latin typeface="Arial"/>
+                <a:ea typeface="DejaVu Sans"/>
+              </a:rPr>
+              <a:t>In “</a:t>
+            </a:r>
+            <a:r>
+              <a:rPr b="0" lang="en-US" sz="1800" spc="-1" strike="noStrike">
+                <a:solidFill>
+                  <a:srgbClr val="c9211e"/>
+                </a:solidFill>
+                <a:latin typeface="Arial"/>
+                <a:ea typeface="DejaVu Sans"/>
+              </a:rPr>
+              <a:t>service.yaml</a:t>
+            </a:r>
+            <a:r>
+              <a:rPr b="0" lang="en-US" sz="1800" spc="-1" strike="noStrike">
+                <a:solidFill>
+                  <a:srgbClr val="000000"/>
+                </a:solidFill>
+                <a:latin typeface="Arial"/>
+                <a:ea typeface="DejaVu Sans"/>
+              </a:rPr>
+              <a:t>”</a:t>
+            </a:r>
+            <a:br/>
+            <a:endParaRPr b="0" lang="en-US" sz="1800" spc="-1" strike="noStrike">
+              <a:latin typeface="Arial"/>
+            </a:endParaRPr>
+          </a:p>
+        </p:txBody>
+      </p:sp>
+      <p:sp>
+        <p:nvSpPr>
+          <p:cNvPr id="298" name="CustomShape 3"/>
+          <p:cNvSpPr/>
+          <p:nvPr/>
+        </p:nvSpPr>
+        <p:spPr>
+          <a:xfrm>
+            <a:off x="10515240" y="6202080"/>
+            <a:ext cx="1587240" cy="414360"/>
+          </a:xfrm>
+          <a:prstGeom prst="rect">
+            <a:avLst/>
+          </a:prstGeom>
+          <a:noFill/>
+          <a:ln>
+            <a:noFill/>
+          </a:ln>
+        </p:spPr>
+        <p:style>
+          <a:lnRef idx="0"/>
+          <a:fillRef idx="0"/>
+          <a:effectRef idx="0"/>
+          <a:fontRef idx="minor"/>
+        </p:style>
+        <p:txBody>
+          <a:bodyPr lIns="90000" rIns="90000" tIns="45000" bIns="45000">
+            <a:noAutofit/>
+          </a:bodyPr>
+          <a:p>
+            <a:pPr algn="ctr">
+              <a:lnSpc>
+                <a:spcPct val="100000"/>
+              </a:lnSpc>
+            </a:pPr>
+            <a:fld id="{94E3787B-4E9C-45A8-8920-B64BA1A02608}" type="slidenum">
+              <a:rPr b="0" lang="en-US" sz="1600" spc="-1" strike="noStrike">
+                <a:solidFill>
+                  <a:srgbClr val="000000"/>
+                </a:solidFill>
+                <a:latin typeface="Times New Roman"/>
+                <a:ea typeface="DejaVu Sans"/>
+              </a:rPr>
+              <a:t>&lt;number&gt;</a:t>
+            </a:fld>
+            <a:endParaRPr b="0" lang="en-US" sz="1600" spc="-1" strike="noStrike">
+              <a:latin typeface="Arial"/>
+            </a:endParaRPr>
+          </a:p>
+        </p:txBody>
+      </p:sp>
+      <p:pic>
+        <p:nvPicPr>
+          <p:cNvPr id="299" name="" descr=""/>
+          <p:cNvPicPr/>
+          <p:nvPr/>
+        </p:nvPicPr>
+        <p:blipFill>
+          <a:blip r:embed="rId1"/>
+          <a:stretch/>
+        </p:blipFill>
+        <p:spPr>
+          <a:xfrm>
+            <a:off x="398880" y="3634560"/>
+            <a:ext cx="2885760" cy="2134800"/>
+          </a:xfrm>
+          <a:prstGeom prst="rect">
+            <a:avLst/>
+          </a:prstGeom>
+          <a:ln>
+            <a:noFill/>
+          </a:ln>
+        </p:spPr>
+      </p:pic>
+      <p:pic>
+        <p:nvPicPr>
+          <p:cNvPr id="300" name="" descr=""/>
+          <p:cNvPicPr/>
+          <p:nvPr/>
+        </p:nvPicPr>
+        <p:blipFill>
+          <a:blip r:embed="rId2"/>
+          <a:stretch/>
+        </p:blipFill>
+        <p:spPr>
+          <a:xfrm>
+            <a:off x="3415680" y="3632760"/>
+            <a:ext cx="2895120" cy="2144160"/>
+          </a:xfrm>
+          <a:prstGeom prst="rect">
+            <a:avLst/>
+          </a:prstGeom>
+          <a:ln>
+            <a:noFill/>
+          </a:ln>
+        </p:spPr>
+      </p:pic>
+    </p:spTree>
+  </p:cSld>
+  <mc:AlternateContent>
+    <mc:Choice Requires="p14">
+      <p:transition spd="slow" p14:dur="2000"/>
+    </mc:Choice>
+    <mc:Fallback>
+      <p:transition spd="slow"/>
+    </mc:Fallback>
+  </mc:AlternateContent>
+</p:sld>
+</file>
+
+<file path=ppt/slides/slide27.xml><?xml version="1.0" encoding="utf-8"?>
+<p:sld xmlns:a="http://schemas.openxmlformats.org/drawingml/2006/main" xmlns:p="http://schemas.openxmlformats.org/presentationml/2006/main" xmlns:r="http://schemas.openxmlformats.org/officeDocument/2006/relationships" xmlns:p14="http://schemas.microsoft.com/office/powerpoint/2010/main" xmlns:p15="http://schemas.microsoft.com/office/powerpoint/2012/main" xmlns:mc="http://schemas.openxmlformats.org/markup-compatibility/2006">
+  <p:cSld>
+    <p:spTree>
+      <p:nvGrpSpPr>
+        <p:cNvPr id="1" name=""/>
+        <p:cNvGrpSpPr/>
+        <p:nvPr/>
+      </p:nvGrpSpPr>
+      <p:grpSpPr>
+        <a:xfrm>
+          <a:off x="0" y="0"/>
+          <a:ext cx="0" cy="0"/>
+          <a:chOff x="0" y="0"/>
+          <a:chExt cx="0" cy="0"/>
+        </a:xfrm>
+      </p:grpSpPr>
+      <p:sp>
+        <p:nvSpPr>
+          <p:cNvPr id="301" name="CustomShape 1"/>
+          <p:cNvSpPr/>
+          <p:nvPr/>
+        </p:nvSpPr>
+        <p:spPr>
+          <a:xfrm>
+            <a:off x="685800" y="0"/>
+            <a:ext cx="10959840" cy="1132200"/>
+          </a:xfrm>
+          <a:prstGeom prst="rect">
+            <a:avLst/>
+          </a:prstGeom>
+          <a:noFill/>
+          <a:ln>
+            <a:noFill/>
+          </a:ln>
+        </p:spPr>
+        <p:style>
+          <a:lnRef idx="0"/>
+          <a:fillRef idx="0"/>
+          <a:effectRef idx="0"/>
+          <a:fontRef idx="minor"/>
+        </p:style>
+        <p:txBody>
+          <a:bodyPr lIns="90000" rIns="90000" tIns="45000" bIns="45000">
+            <a:noAutofit/>
+          </a:bodyPr>
+          <a:p>
+            <a:pPr algn="ctr">
+              <a:lnSpc>
+                <a:spcPct val="90000"/>
+              </a:lnSpc>
+              <a:spcBef>
+                <a:spcPts val="1001"/>
+              </a:spcBef>
+            </a:pPr>
+            <a:r>
+              <a:rPr b="1" lang="en-US" sz="3200" spc="-1" strike="noStrike">
+                <a:solidFill>
+                  <a:srgbClr val="3465a4"/>
+                </a:solidFill>
+                <a:latin typeface="Arial"/>
+                <a:ea typeface="Noto Sans CJK SC"/>
+              </a:rPr>
+              <a:t>3- Helm Chart</a:t>
+            </a:r>
+            <a:br/>
+            <a:br/>
+            <a:r>
+              <a:rPr b="0" lang="en-US" sz="1800" spc="-1" strike="noStrike">
+                <a:solidFill>
+                  <a:srgbClr val="000000"/>
+                </a:solidFill>
+                <a:latin typeface="Arial"/>
+                <a:ea typeface="DejaVu Sans"/>
+              </a:rPr>
+              <a:t>Conditional statements and </a:t>
+            </a:r>
+            <a:r>
+              <a:rPr b="1" lang="en-US" sz="1800" spc="-1" strike="noStrike">
+                <a:solidFill>
+                  <a:srgbClr val="000000"/>
+                </a:solidFill>
+                <a:latin typeface="Arial"/>
+                <a:ea typeface="DejaVu Sans"/>
+              </a:rPr>
+              <a:t>loops</a:t>
+            </a:r>
+            <a:r>
+              <a:rPr b="0" lang="en-US" sz="2200" spc="-1" strike="noStrike">
+                <a:solidFill>
+                  <a:srgbClr val="000000"/>
+                </a:solidFill>
+                <a:latin typeface="Arial"/>
+                <a:ea typeface="Noto Sans CJK SC"/>
+              </a:rPr>
+              <a:t> - 2</a:t>
+            </a:r>
+            <a:endParaRPr b="0" lang="en-US" sz="2200" spc="-1" strike="noStrike">
+              <a:latin typeface="Arial"/>
+            </a:endParaRPr>
+          </a:p>
+        </p:txBody>
+      </p:sp>
+      <p:sp>
+        <p:nvSpPr>
+          <p:cNvPr id="302" name="CustomShape 2"/>
+          <p:cNvSpPr/>
+          <p:nvPr/>
+        </p:nvSpPr>
+        <p:spPr>
+          <a:xfrm>
+            <a:off x="274320" y="1554480"/>
+            <a:ext cx="11063160" cy="4479480"/>
+          </a:xfrm>
+          <a:prstGeom prst="rect">
+            <a:avLst/>
+          </a:prstGeom>
+          <a:noFill/>
+          <a:ln cap="rnd" w="6480">
+            <a:solidFill>
+              <a:srgbClr val="5eb91e"/>
+            </a:solidFill>
+            <a:round/>
+          </a:ln>
+        </p:spPr>
+        <p:style>
+          <a:lnRef idx="0"/>
+          <a:fillRef idx="0"/>
+          <a:effectRef idx="0"/>
+          <a:fontRef idx="minor"/>
+        </p:style>
+        <p:txBody>
+          <a:bodyPr lIns="93240" rIns="93240" tIns="48240" bIns="48240">
+            <a:noAutofit/>
+          </a:bodyPr>
+          <a:p>
+            <a:pPr>
+              <a:lnSpc>
+                <a:spcPct val="100000"/>
+              </a:lnSpc>
+              <a:spcBef>
+                <a:spcPts val="1417"/>
+              </a:spcBef>
+            </a:pPr>
+            <a:r>
+              <a:rPr b="0" lang="en-US" sz="1800" spc="-1" strike="noStrike" u="sng">
+                <a:uFillTx/>
+                <a:latin typeface="Arial"/>
+                <a:ea typeface="DejaVu Sans"/>
+              </a:rPr>
+              <a:t>Definition</a:t>
+            </a:r>
+            <a:r>
+              <a:rPr b="0" lang="en-US" sz="1800" spc="-1" strike="noStrike">
+                <a:latin typeface="Arial"/>
+                <a:ea typeface="DejaVu Sans"/>
+              </a:rPr>
+              <a:t>: loop through items in a collection and execute a block of code for each item. It onlny includes </a:t>
+            </a:r>
+            <a:r>
+              <a:rPr b="0" lang="en-US" sz="1800" spc="-1" strike="noStrike">
+                <a:solidFill>
+                  <a:srgbClr val="c9211e"/>
+                </a:solidFill>
+                <a:latin typeface="Arial"/>
+                <a:ea typeface="DejaVu Sans"/>
+              </a:rPr>
+              <a:t>range</a:t>
+            </a:r>
+            <a:r>
+              <a:rPr b="0" lang="en-US" sz="1800" spc="-1" strike="noStrike">
+                <a:latin typeface="Arial"/>
+                <a:ea typeface="DejaVu Sans"/>
+              </a:rPr>
+              <a:t> </a:t>
+            </a:r>
+            <a:r>
+              <a:rPr b="0" lang="en-US" sz="1800" spc="-1" strike="noStrike">
+                <a:latin typeface="Arial"/>
+                <a:ea typeface="DejaVu Sans"/>
+              </a:rPr>
+              <a:t>statements.</a:t>
+            </a:r>
+            <a:endParaRPr b="0" lang="en-US" sz="1800" spc="-1" strike="noStrike">
+              <a:latin typeface="Arial"/>
+            </a:endParaRPr>
+          </a:p>
+          <a:p>
+            <a:pPr>
+              <a:lnSpc>
+                <a:spcPct val="100000"/>
+              </a:lnSpc>
+              <a:spcBef>
+                <a:spcPts val="1417"/>
+              </a:spcBef>
+            </a:pPr>
+            <a:r>
+              <a:rPr b="0" lang="en-US" sz="1800" spc="-1" strike="noStrike">
+                <a:latin typeface="Arial"/>
+                <a:ea typeface="DejaVu Sans"/>
+              </a:rPr>
+              <a:t>Exampe:</a:t>
+            </a:r>
+            <a:br/>
+            <a:r>
+              <a:rPr b="0" lang="en-US" sz="1800" spc="-1" strike="noStrike">
+                <a:latin typeface="Arial"/>
+                <a:ea typeface="DejaVu Sans"/>
+              </a:rPr>
+              <a:t>- input: </a:t>
+            </a:r>
+            <a:br/>
+            <a:br/>
+            <a:endParaRPr b="0" lang="en-US" sz="1800" spc="-1" strike="noStrike">
+              <a:latin typeface="Arial"/>
+            </a:endParaRPr>
+          </a:p>
+          <a:p>
+            <a:pPr>
+              <a:lnSpc>
+                <a:spcPct val="100000"/>
+              </a:lnSpc>
+              <a:spcBef>
+                <a:spcPts val="1417"/>
+              </a:spcBef>
+            </a:pPr>
+            <a:br/>
+            <a:endParaRPr b="0" lang="en-US" sz="1800" spc="-1" strike="noStrike">
+              <a:latin typeface="Arial"/>
+            </a:endParaRPr>
+          </a:p>
+          <a:p>
+            <a:pPr>
+              <a:lnSpc>
+                <a:spcPct val="100000"/>
+              </a:lnSpc>
+              <a:spcBef>
+                <a:spcPts val="1417"/>
+              </a:spcBef>
+            </a:pPr>
+            <a:br/>
+            <a:r>
+              <a:rPr b="0" lang="en-US" sz="1800" spc="-1" strike="noStrike">
+                <a:solidFill>
+                  <a:srgbClr val="000000"/>
+                </a:solidFill>
+                <a:latin typeface="Arial"/>
+                <a:ea typeface="DejaVu Sans"/>
+              </a:rPr>
+              <a:t>- output:</a:t>
+            </a:r>
+            <a:endParaRPr b="0" lang="en-US" sz="1800" spc="-1" strike="noStrike">
+              <a:latin typeface="Arial"/>
+            </a:endParaRPr>
+          </a:p>
+          <a:p>
+            <a:pPr>
+              <a:lnSpc>
+                <a:spcPct val="100000"/>
+              </a:lnSpc>
+              <a:spcBef>
+                <a:spcPts val="1417"/>
+              </a:spcBef>
+            </a:pPr>
+            <a:endParaRPr b="0" lang="en-US" sz="1800" spc="-1" strike="noStrike">
+              <a:latin typeface="Arial"/>
+            </a:endParaRPr>
+          </a:p>
+        </p:txBody>
+      </p:sp>
+      <p:sp>
+        <p:nvSpPr>
+          <p:cNvPr id="303" name="CustomShape 3"/>
+          <p:cNvSpPr/>
+          <p:nvPr/>
+        </p:nvSpPr>
+        <p:spPr>
+          <a:xfrm>
+            <a:off x="10515240" y="6202080"/>
+            <a:ext cx="1587240" cy="414360"/>
+          </a:xfrm>
+          <a:prstGeom prst="rect">
+            <a:avLst/>
+          </a:prstGeom>
+          <a:noFill/>
+          <a:ln>
+            <a:noFill/>
+          </a:ln>
+        </p:spPr>
+        <p:style>
+          <a:lnRef idx="0"/>
+          <a:fillRef idx="0"/>
+          <a:effectRef idx="0"/>
+          <a:fontRef idx="minor"/>
+        </p:style>
+        <p:txBody>
+          <a:bodyPr lIns="90000" rIns="90000" tIns="45000" bIns="45000">
+            <a:noAutofit/>
+          </a:bodyPr>
+          <a:p>
+            <a:pPr algn="ctr">
+              <a:lnSpc>
+                <a:spcPct val="100000"/>
+              </a:lnSpc>
+            </a:pPr>
+            <a:fld id="{F40A53AE-194E-4DFA-B19D-F6FA157CE69B}" type="slidenum">
+              <a:rPr b="0" lang="en-US" sz="1600" spc="-1" strike="noStrike">
+                <a:solidFill>
+                  <a:srgbClr val="000000"/>
+                </a:solidFill>
+                <a:latin typeface="Times New Roman"/>
+                <a:ea typeface="DejaVu Sans"/>
+              </a:rPr>
+              <a:t>&lt;number&gt;</a:t>
+            </a:fld>
+            <a:endParaRPr b="0" lang="en-US" sz="1600" spc="-1" strike="noStrike">
+              <a:latin typeface="Arial"/>
+            </a:endParaRPr>
+          </a:p>
+        </p:txBody>
+      </p:sp>
+      <p:pic>
+        <p:nvPicPr>
+          <p:cNvPr id="304" name="" descr=""/>
+          <p:cNvPicPr/>
+          <p:nvPr/>
+        </p:nvPicPr>
+        <p:blipFill>
+          <a:blip r:embed="rId1"/>
+          <a:stretch/>
+        </p:blipFill>
+        <p:spPr>
+          <a:xfrm>
+            <a:off x="1122480" y="2677680"/>
+            <a:ext cx="1913400" cy="1589400"/>
+          </a:xfrm>
+          <a:prstGeom prst="rect">
+            <a:avLst/>
+          </a:prstGeom>
+          <a:ln>
+            <a:noFill/>
+          </a:ln>
+        </p:spPr>
+      </p:pic>
+      <p:pic>
+        <p:nvPicPr>
+          <p:cNvPr id="305" name="" descr=""/>
+          <p:cNvPicPr/>
+          <p:nvPr/>
+        </p:nvPicPr>
+        <p:blipFill>
+          <a:blip r:embed="rId2"/>
+          <a:stretch/>
+        </p:blipFill>
+        <p:spPr>
+          <a:xfrm>
+            <a:off x="3075480" y="2681280"/>
+            <a:ext cx="2971440" cy="1577880"/>
+          </a:xfrm>
+          <a:prstGeom prst="rect">
+            <a:avLst/>
+          </a:prstGeom>
+          <a:ln>
+            <a:noFill/>
+          </a:ln>
+        </p:spPr>
+      </p:pic>
+      <p:pic>
+        <p:nvPicPr>
+          <p:cNvPr id="306" name="" descr=""/>
+          <p:cNvPicPr/>
+          <p:nvPr/>
+        </p:nvPicPr>
+        <p:blipFill>
+          <a:blip r:embed="rId3"/>
+          <a:stretch/>
+        </p:blipFill>
+        <p:spPr>
+          <a:xfrm>
+            <a:off x="1209240" y="4628880"/>
+            <a:ext cx="2304720" cy="1399680"/>
+          </a:xfrm>
+          <a:prstGeom prst="rect">
+            <a:avLst/>
+          </a:prstGeom>
+          <a:ln>
+            <a:noFill/>
+          </a:ln>
+        </p:spPr>
+      </p:pic>
+    </p:spTree>
+  </p:cSld>
+  <mc:AlternateContent>
+    <mc:Choice Requires="p14">
+      <p:transition spd="slow" p14:dur="2000"/>
+    </mc:Choice>
+    <mc:Fallback>
+      <p:transition spd="slow"/>
+    </mc:Fallback>
+  </mc:AlternateContent>
+</p:sld>
+</file>
+
+<file path=ppt/slides/slide28.xml><?xml version="1.0" encoding="utf-8"?>
+<p:sld xmlns:a="http://schemas.openxmlformats.org/drawingml/2006/main" xmlns:p="http://schemas.openxmlformats.org/presentationml/2006/main" xmlns:r="http://schemas.openxmlformats.org/officeDocument/2006/relationships" xmlns:p14="http://schemas.microsoft.com/office/powerpoint/2010/main" xmlns:p15="http://schemas.microsoft.com/office/powerpoint/2012/main" xmlns:mc="http://schemas.openxmlformats.org/markup-compatibility/2006">
+  <p:cSld>
+    <p:spTree>
+      <p:nvGrpSpPr>
+        <p:cNvPr id="1" name=""/>
+        <p:cNvGrpSpPr/>
+        <p:nvPr/>
+      </p:nvGrpSpPr>
+      <p:grpSpPr>
+        <a:xfrm>
+          <a:off x="0" y="0"/>
+          <a:ext cx="0" cy="0"/>
+          <a:chOff x="0" y="0"/>
+          <a:chExt cx="0" cy="0"/>
+        </a:xfrm>
+      </p:grpSpPr>
+      <p:sp>
+        <p:nvSpPr>
+          <p:cNvPr id="307" name="CustomShape 1"/>
+          <p:cNvSpPr/>
+          <p:nvPr/>
+        </p:nvSpPr>
+        <p:spPr>
+          <a:xfrm>
+            <a:off x="685800" y="0"/>
+            <a:ext cx="10959840" cy="1132200"/>
+          </a:xfrm>
+          <a:prstGeom prst="rect">
+            <a:avLst/>
+          </a:prstGeom>
+          <a:noFill/>
+          <a:ln>
+            <a:noFill/>
+          </a:ln>
+        </p:spPr>
+        <p:style>
+          <a:lnRef idx="0"/>
+          <a:fillRef idx="0"/>
+          <a:effectRef idx="0"/>
+          <a:fontRef idx="minor"/>
+        </p:style>
+        <p:txBody>
+          <a:bodyPr lIns="90000" rIns="90000" tIns="45000" bIns="45000">
+            <a:noAutofit/>
+          </a:bodyPr>
+          <a:p>
+            <a:pPr algn="ctr">
+              <a:lnSpc>
+                <a:spcPct val="90000"/>
+              </a:lnSpc>
+              <a:spcBef>
+                <a:spcPts val="1001"/>
+              </a:spcBef>
+            </a:pPr>
+            <a:r>
+              <a:rPr b="1" lang="en-US" sz="3200" spc="-1" strike="noStrike">
+                <a:solidFill>
+                  <a:srgbClr val="3465a4"/>
+                </a:solidFill>
+                <a:latin typeface="Arial"/>
+                <a:ea typeface="Noto Sans CJK SC"/>
+              </a:rPr>
+              <a:t>4- Helm Chart Repository</a:t>
+            </a:r>
+            <a:endParaRPr b="0" lang="en-US" sz="3200" spc="-1" strike="noStrike">
+              <a:latin typeface="Arial"/>
+            </a:endParaRPr>
+          </a:p>
+        </p:txBody>
+      </p:sp>
+      <p:sp>
+        <p:nvSpPr>
+          <p:cNvPr id="308" name="CustomShape 2"/>
+          <p:cNvSpPr/>
+          <p:nvPr/>
+        </p:nvSpPr>
+        <p:spPr>
+          <a:xfrm>
+            <a:off x="274320" y="1554480"/>
+            <a:ext cx="11063160" cy="4479480"/>
+          </a:xfrm>
+          <a:prstGeom prst="rect">
+            <a:avLst/>
+          </a:prstGeom>
+          <a:noFill/>
+          <a:ln cap="rnd" w="6480">
+            <a:solidFill>
+              <a:srgbClr val="5eb91e"/>
+            </a:solidFill>
+            <a:round/>
+          </a:ln>
+        </p:spPr>
+        <p:style>
+          <a:lnRef idx="0"/>
+          <a:fillRef idx="0"/>
+          <a:effectRef idx="0"/>
+          <a:fontRef idx="minor"/>
+        </p:style>
+        <p:txBody>
+          <a:bodyPr lIns="93240" rIns="93240" tIns="48240" bIns="48240">
+            <a:noAutofit/>
+          </a:bodyPr>
+          <a:p>
+            <a:pPr>
+              <a:lnSpc>
+                <a:spcPct val="100000"/>
+              </a:lnSpc>
+              <a:spcBef>
+                <a:spcPts val="1417"/>
+              </a:spcBef>
+            </a:pPr>
+            <a:r>
+              <a:rPr b="0" lang="en-US" sz="1800" spc="-1" strike="noStrike" u="sng">
+                <a:uFillTx/>
+                <a:latin typeface="Arial"/>
+                <a:ea typeface="DejaVu Sans"/>
+              </a:rPr>
+              <a:t>Definition</a:t>
+            </a:r>
+            <a:r>
+              <a:rPr b="0" lang="en-US" sz="1800" spc="-1" strike="noStrike">
+                <a:latin typeface="Arial"/>
+                <a:ea typeface="DejaVu Sans"/>
+              </a:rPr>
+              <a:t>: a server that stores Helm charts.</a:t>
+            </a:r>
+            <a:endParaRPr b="0" lang="en-US" sz="1800" spc="-1" strike="noStrike">
+              <a:latin typeface="Arial"/>
+            </a:endParaRPr>
+          </a:p>
+          <a:p>
+            <a:pPr>
+              <a:lnSpc>
+                <a:spcPct val="100000"/>
+              </a:lnSpc>
+              <a:spcBef>
+                <a:spcPts val="1417"/>
+              </a:spcBef>
+            </a:pPr>
+            <a:r>
+              <a:rPr b="0" lang="en-US" sz="1800" spc="-1" strike="noStrike" u="sng">
+                <a:uFillTx/>
+                <a:latin typeface="Arial"/>
+                <a:ea typeface="DejaVu Sans"/>
+              </a:rPr>
+              <a:t>Kinds</a:t>
+            </a:r>
+            <a:r>
+              <a:rPr b="0" lang="en-US" sz="1800" spc="-1" strike="noStrike">
+                <a:latin typeface="Arial"/>
+                <a:ea typeface="DejaVu Sans"/>
+              </a:rPr>
+              <a:t>: </a:t>
+            </a:r>
+            <a:br/>
+            <a:r>
+              <a:rPr b="0" lang="en-US" sz="1800" spc="-1" strike="noStrike">
+                <a:latin typeface="Arial"/>
+                <a:ea typeface="DejaVu Sans"/>
+              </a:rPr>
+              <a:t>- </a:t>
+            </a:r>
+            <a:r>
+              <a:rPr b="0" lang="en-US" sz="1800" spc="-1" strike="noStrike">
+                <a:solidFill>
+                  <a:srgbClr val="c9211e"/>
+                </a:solidFill>
+                <a:latin typeface="Arial"/>
+                <a:ea typeface="DejaVu Sans"/>
+              </a:rPr>
+              <a:t>Public</a:t>
+            </a:r>
+            <a:r>
+              <a:rPr b="0" lang="en-US" sz="1800" spc="-1" strike="noStrike">
+                <a:latin typeface="Arial"/>
+                <a:ea typeface="DejaVu Sans"/>
+              </a:rPr>
+              <a:t> chart repositories: Helm hub / Artifact hub (</a:t>
+            </a:r>
+            <a:r>
+              <a:rPr b="0" lang="en-US" sz="1800" spc="-1" strike="noStrike">
+                <a:latin typeface="Arial"/>
+                <a:ea typeface="DejaVu Sans"/>
+                <a:hlinkClick r:id="rId1"/>
+              </a:rPr>
+              <a:t>https://artifacthub.io/</a:t>
+            </a:r>
+            <a:r>
+              <a:rPr b="0" lang="en-US" sz="1800" spc="-1" strike="noStrike">
+                <a:latin typeface="Arial"/>
+                <a:ea typeface="DejaVu Sans"/>
+              </a:rPr>
+              <a:t>), Bitnami charts (</a:t>
+            </a:r>
+            <a:r>
+              <a:rPr b="0" lang="en-US" sz="1800" spc="-1" strike="noStrike">
+                <a:latin typeface="Arial"/>
+                <a:ea typeface="DejaVu Sans"/>
+                <a:hlinkClick r:id="rId2"/>
+              </a:rPr>
+              <a:t>https://bitnami.com/stacks/helm</a:t>
+            </a:r>
+            <a:r>
+              <a:rPr b="0" lang="en-US" sz="1800" spc="-1" strike="noStrike">
+                <a:latin typeface="Arial"/>
+                <a:ea typeface="DejaVu Sans"/>
+              </a:rPr>
+              <a:t>), Github, ...</a:t>
+            </a:r>
+            <a:br/>
+            <a:r>
+              <a:rPr b="0" lang="en-US" sz="1800" spc="-1" strike="noStrike">
+                <a:latin typeface="Arial"/>
+                <a:ea typeface="DejaVu Sans"/>
+              </a:rPr>
+              <a:t>- </a:t>
+            </a:r>
+            <a:r>
+              <a:rPr b="0" lang="en-US" sz="1800" spc="-1" strike="noStrike">
+                <a:solidFill>
+                  <a:srgbClr val="c9211e"/>
+                </a:solidFill>
+                <a:latin typeface="Arial"/>
+                <a:ea typeface="DejaVu Sans"/>
+              </a:rPr>
+              <a:t>Private</a:t>
+            </a:r>
+            <a:r>
+              <a:rPr b="0" lang="en-US" sz="1800" spc="-1" strike="noStrike">
+                <a:latin typeface="Arial"/>
+                <a:ea typeface="DejaVu Sans"/>
+              </a:rPr>
+              <a:t> chart repositories: Artifactory, Gitlab, ...</a:t>
+            </a:r>
+            <a:endParaRPr b="0" lang="en-US" sz="1800" spc="-1" strike="noStrike">
+              <a:latin typeface="Arial"/>
+            </a:endParaRPr>
+          </a:p>
+          <a:p>
+            <a:pPr>
+              <a:lnSpc>
+                <a:spcPct val="100000"/>
+              </a:lnSpc>
+              <a:spcBef>
+                <a:spcPts val="1417"/>
+              </a:spcBef>
+            </a:pPr>
+            <a:r>
+              <a:rPr b="0" lang="en-US" sz="1800" spc="-1" strike="noStrike">
+                <a:latin typeface="Arial"/>
+                <a:ea typeface="DejaVu Sans"/>
+              </a:rPr>
+              <a:t> </a:t>
+            </a:r>
+            <a:r>
+              <a:rPr b="0" lang="en-US" sz="1800" spc="-1" strike="noStrike" u="sng">
+                <a:uFillTx/>
+                <a:latin typeface="Arial"/>
+                <a:ea typeface="DejaVu Sans"/>
+              </a:rPr>
+              <a:t>Example using Github</a:t>
+            </a:r>
+            <a:r>
+              <a:rPr b="0" lang="en-US" sz="1800" spc="-1" strike="noStrike">
+                <a:latin typeface="Arial"/>
+                <a:ea typeface="DejaVu Sans"/>
+              </a:rPr>
+              <a:t>: </a:t>
+            </a:r>
+            <a:br/>
+            <a:r>
+              <a:rPr b="0" lang="en-US" sz="1800" spc="-1" strike="noStrike">
+                <a:latin typeface="Arial"/>
+                <a:ea typeface="DejaVu Sans"/>
+              </a:rPr>
+              <a:t>- Create a helm chart: upload the whole </a:t>
+            </a:r>
+            <a:r>
+              <a:rPr b="0" lang="en-US" sz="1800" spc="-1" strike="noStrike">
+                <a:solidFill>
+                  <a:srgbClr val="c9211e"/>
+                </a:solidFill>
+                <a:latin typeface="Arial"/>
+                <a:ea typeface="DejaVu Sans"/>
+              </a:rPr>
+              <a:t>local folder structure</a:t>
+            </a:r>
+            <a:r>
+              <a:rPr b="0" lang="en-US" sz="1800" spc="-1" strike="noStrike">
+                <a:latin typeface="Arial"/>
+                <a:ea typeface="DejaVu Sans"/>
+              </a:rPr>
+              <a:t> to a Github repo</a:t>
+            </a:r>
+            <a:br/>
+            <a:r>
+              <a:rPr b="0" lang="en-US" sz="1800" spc="-1" strike="noStrike">
+                <a:latin typeface="Arial"/>
+                <a:ea typeface="DejaVu Sans"/>
+              </a:rPr>
+              <a:t>- Reference:</a:t>
+            </a:r>
+            <a:endParaRPr b="0" lang="en-US" sz="1800" spc="-1" strike="noStrike">
+              <a:latin typeface="Arial"/>
+            </a:endParaRPr>
+          </a:p>
+          <a:p>
+            <a:pPr>
+              <a:lnSpc>
+                <a:spcPct val="100000"/>
+              </a:lnSpc>
+              <a:spcBef>
+                <a:spcPts val="1417"/>
+              </a:spcBef>
+            </a:pPr>
+            <a:endParaRPr b="0" lang="en-US" sz="1800" spc="-1" strike="noStrike">
+              <a:latin typeface="Arial"/>
+            </a:endParaRPr>
+          </a:p>
+        </p:txBody>
+      </p:sp>
+      <p:sp>
+        <p:nvSpPr>
+          <p:cNvPr id="309" name="CustomShape 3"/>
+          <p:cNvSpPr/>
+          <p:nvPr/>
+        </p:nvSpPr>
+        <p:spPr>
+          <a:xfrm>
+            <a:off x="10515240" y="6202080"/>
+            <a:ext cx="1587240" cy="414360"/>
+          </a:xfrm>
+          <a:prstGeom prst="rect">
+            <a:avLst/>
+          </a:prstGeom>
+          <a:noFill/>
+          <a:ln>
+            <a:noFill/>
+          </a:ln>
+        </p:spPr>
+        <p:style>
+          <a:lnRef idx="0"/>
+          <a:fillRef idx="0"/>
+          <a:effectRef idx="0"/>
+          <a:fontRef idx="minor"/>
+        </p:style>
+        <p:txBody>
+          <a:bodyPr lIns="90000" rIns="90000" tIns="45000" bIns="45000">
+            <a:noAutofit/>
+          </a:bodyPr>
+          <a:p>
+            <a:pPr algn="ctr">
+              <a:lnSpc>
+                <a:spcPct val="100000"/>
+              </a:lnSpc>
+            </a:pPr>
+            <a:fld id="{42793FA1-173F-41F8-9029-805D182A194F}" type="slidenum">
+              <a:rPr b="0" lang="en-US" sz="1600" spc="-1" strike="noStrike">
+                <a:solidFill>
+                  <a:srgbClr val="000000"/>
+                </a:solidFill>
+                <a:latin typeface="Times New Roman"/>
+                <a:ea typeface="DejaVu Sans"/>
+              </a:rPr>
+              <a:t>&lt;number&gt;</a:t>
+            </a:fld>
+            <a:endParaRPr b="0" lang="en-US" sz="1600" spc="-1" strike="noStrike">
+              <a:latin typeface="Arial"/>
+            </a:endParaRPr>
+          </a:p>
+        </p:txBody>
+      </p:sp>
+      <p:pic>
+        <p:nvPicPr>
+          <p:cNvPr id="310" name="" descr=""/>
+          <p:cNvPicPr/>
+          <p:nvPr/>
+        </p:nvPicPr>
+        <p:blipFill>
+          <a:blip r:embed="rId3"/>
+          <a:stretch/>
+        </p:blipFill>
+        <p:spPr>
+          <a:xfrm>
+            <a:off x="496440" y="4229640"/>
+            <a:ext cx="9019800" cy="971280"/>
+          </a:xfrm>
+          <a:prstGeom prst="rect">
+            <a:avLst/>
+          </a:prstGeom>
+          <a:ln>
+            <a:noFill/>
+          </a:ln>
+        </p:spPr>
+      </p:pic>
+    </p:spTree>
+  </p:cSld>
+  <mc:AlternateContent>
+    <mc:Choice Requires="p14">
+      <p:transition spd="slow" p14:dur="2000"/>
+    </mc:Choice>
+    <mc:Fallback>
+      <p:transition spd="slow"/>
+    </mc:Fallback>
+  </mc:AlternateContent>
+</p:sld>
+</file>
+
+<file path=ppt/slides/slide29.xml><?xml version="1.0" encoding="utf-8"?>
+<p:sld xmlns:a="http://schemas.openxmlformats.org/drawingml/2006/main" xmlns:p="http://schemas.openxmlformats.org/presentationml/2006/main" xmlns:r="http://schemas.openxmlformats.org/officeDocument/2006/relationships" xmlns:p14="http://schemas.microsoft.com/office/powerpoint/2010/main" xmlns:p15="http://schemas.microsoft.com/office/powerpoint/2012/main" xmlns:mc="http://schemas.openxmlformats.org/markup-compatibility/2006">
+  <p:cSld>
+    <p:spTree>
+      <p:nvGrpSpPr>
+        <p:cNvPr id="1" name=""/>
+        <p:cNvGrpSpPr/>
+        <p:nvPr/>
+      </p:nvGrpSpPr>
+      <p:grpSpPr>
+        <a:xfrm>
+          <a:off x="0" y="0"/>
+          <a:ext cx="0" cy="0"/>
+          <a:chOff x="0" y="0"/>
+          <a:chExt cx="0" cy="0"/>
+        </a:xfrm>
+      </p:grpSpPr>
+      <p:sp>
+        <p:nvSpPr>
+          <p:cNvPr id="311" name="CustomShape 1"/>
+          <p:cNvSpPr/>
+          <p:nvPr/>
+        </p:nvSpPr>
+        <p:spPr>
+          <a:xfrm>
+            <a:off x="3428640" y="376920"/>
+            <a:ext cx="5697000" cy="524520"/>
+          </a:xfrm>
+          <a:prstGeom prst="rect">
+            <a:avLst/>
+          </a:prstGeom>
+          <a:noFill/>
+          <a:ln>
+            <a:noFill/>
+          </a:ln>
+        </p:spPr>
+        <p:style>
+          <a:lnRef idx="0"/>
+          <a:fillRef idx="0"/>
+          <a:effectRef idx="0"/>
+          <a:fontRef idx="minor"/>
+        </p:style>
+        <p:txBody>
+          <a:bodyPr lIns="90000" rIns="90000" tIns="45000" bIns="45000">
+            <a:noAutofit/>
+          </a:bodyPr>
+          <a:p>
+            <a:pPr algn="ctr">
+              <a:lnSpc>
+                <a:spcPct val="90000"/>
+              </a:lnSpc>
+              <a:spcBef>
+                <a:spcPts val="1001"/>
+              </a:spcBef>
+            </a:pPr>
+            <a:r>
+              <a:rPr b="1" lang="en-US" sz="3200" spc="-1" strike="noStrike">
+                <a:solidFill>
+                  <a:srgbClr val="3465a4"/>
+                </a:solidFill>
+                <a:latin typeface="Arial"/>
+                <a:ea typeface="DejaVu Sans"/>
+              </a:rPr>
+              <a:t>Questions and Answers</a:t>
+            </a:r>
+            <a:endParaRPr b="0" lang="en-US" sz="3200" spc="-1" strike="noStrike">
+              <a:latin typeface="Arial"/>
+            </a:endParaRPr>
+          </a:p>
+        </p:txBody>
+      </p:sp>
+      <p:sp>
+        <p:nvSpPr>
+          <p:cNvPr id="312" name="CustomShape 2"/>
+          <p:cNvSpPr/>
+          <p:nvPr/>
+        </p:nvSpPr>
+        <p:spPr>
+          <a:xfrm>
+            <a:off x="10515240" y="6202080"/>
+            <a:ext cx="1587240" cy="414360"/>
+          </a:xfrm>
+          <a:prstGeom prst="rect">
+            <a:avLst/>
+          </a:prstGeom>
+          <a:noFill/>
+          <a:ln>
+            <a:noFill/>
+          </a:ln>
+        </p:spPr>
+        <p:style>
+          <a:lnRef idx="0"/>
+          <a:fillRef idx="0"/>
+          <a:effectRef idx="0"/>
+          <a:fontRef idx="minor"/>
+        </p:style>
+        <p:txBody>
+          <a:bodyPr lIns="90000" rIns="90000" tIns="45000" bIns="45000">
+            <a:noAutofit/>
+          </a:bodyPr>
+          <a:p>
+            <a:pPr algn="ctr">
+              <a:lnSpc>
+                <a:spcPct val="100000"/>
+              </a:lnSpc>
+            </a:pPr>
+            <a:fld id="{8B47FDCE-2887-4FFD-B6A6-FABCE6186595}" type="slidenum">
+              <a:rPr b="0" lang="en-US" sz="1600" spc="-1" strike="noStrike">
+                <a:solidFill>
+                  <a:srgbClr val="000000"/>
+                </a:solidFill>
+                <a:latin typeface="Times New Roman"/>
+                <a:ea typeface="DejaVu Sans"/>
+              </a:rPr>
+              <a:t>&lt;number&gt;</a:t>
+            </a:fld>
+            <a:endParaRPr b="0" lang="en-US" sz="1600" spc="-1" strike="noStrike">
+              <a:latin typeface="Arial"/>
+            </a:endParaRPr>
+          </a:p>
+        </p:txBody>
+      </p:sp>
+      <p:pic>
+        <p:nvPicPr>
+          <p:cNvPr id="313" name="Picture 412" descr=""/>
+          <p:cNvPicPr/>
+          <p:nvPr/>
+        </p:nvPicPr>
+        <p:blipFill>
+          <a:blip r:embed="rId1"/>
+          <a:stretch/>
+        </p:blipFill>
+        <p:spPr>
+          <a:xfrm>
+            <a:off x="4114440" y="2105280"/>
+            <a:ext cx="4636800" cy="3141360"/>
+          </a:xfrm>
+          <a:prstGeom prst="rect">
+            <a:avLst/>
+          </a:prstGeom>
+          <a:ln>
+            <a:noFill/>
+          </a:ln>
+        </p:spPr>
+      </p:pic>
     </p:spTree>
   </p:cSld>
   <mc:AlternateContent>
@@ -14595,7 +16762,7 @@
         <p:spPr>
           <a:xfrm>
             <a:off x="685800" y="0"/>
-            <a:ext cx="10960200" cy="1132560"/>
+            <a:ext cx="10959840" cy="1132200"/>
           </a:xfrm>
           <a:prstGeom prst="rect">
             <a:avLst/>
@@ -14661,7 +16828,7 @@
         <p:spPr>
           <a:xfrm>
             <a:off x="274320" y="1554480"/>
-            <a:ext cx="11063520" cy="4479840"/>
+            <a:ext cx="11063160" cy="4479480"/>
           </a:xfrm>
           <a:prstGeom prst="rect">
             <a:avLst/>
@@ -14718,7 +16885,7 @@
         <p:spPr>
           <a:xfrm>
             <a:off x="10515240" y="6202080"/>
-            <a:ext cx="1587600" cy="414720"/>
+            <a:ext cx="1587240" cy="414360"/>
           </a:xfrm>
           <a:prstGeom prst="rect">
             <a:avLst/>
@@ -14744,7 +16911,7 @@
                 <a:spcPct val="100000"/>
               </a:lnSpc>
             </a:pPr>
-            <a:fld id="{8187EC1C-43A3-4044-BAA2-6F3760D7ED2E}" type="slidenum">
+            <a:fld id="{0D19179C-2F47-4444-A128-5CC0136085F2}" type="slidenum">
               <a:rPr b="0" lang="en-US" sz="1600" spc="-1" strike="noStrike">
                 <a:solidFill>
                   <a:srgbClr val="000000"/>
@@ -14773,7 +16940,7 @@
         <p:spPr>
           <a:xfrm>
             <a:off x="2745360" y="2250000"/>
-            <a:ext cx="5209200" cy="3418560"/>
+            <a:ext cx="5208840" cy="3418200"/>
           </a:xfrm>
           <a:prstGeom prst="rect">
             <a:avLst/>
@@ -14783,6 +16950,36 @@
           </a:ln>
         </p:spPr>
       </p:pic>
+    </p:spTree>
+  </p:cSld>
+  <mc:AlternateContent>
+    <mc:Choice Requires="p14">
+      <p:transition spd="slow" p14:dur="2000"/>
+    </mc:Choice>
+    <mc:Fallback>
+      <p:transition spd="slow"/>
+    </mc:Fallback>
+  </mc:AlternateContent>
+</p:sld>
+</file>
+
+<file path=ppt/slides/slide30.xml><?xml version="1.0" encoding="utf-8"?>
+<p:sld xmlns:a="http://schemas.openxmlformats.org/drawingml/2006/main" xmlns:p="http://schemas.openxmlformats.org/presentationml/2006/main" xmlns:r="http://schemas.openxmlformats.org/officeDocument/2006/relationships" xmlns:p14="http://schemas.microsoft.com/office/powerpoint/2010/main" xmlns:p15="http://schemas.microsoft.com/office/powerpoint/2012/main" xmlns:mc="http://schemas.openxmlformats.org/markup-compatibility/2006">
+  <p:cSld>
+    <p:spTree>
+      <p:nvGrpSpPr>
+        <p:cNvPr id="1" name=""/>
+        <p:cNvGrpSpPr/>
+        <p:nvPr/>
+      </p:nvGrpSpPr>
+      <p:grpSpPr>
+        <a:xfrm>
+          <a:off x="0" y="0"/>
+          <a:ext cx="0" cy="0"/>
+          <a:chOff x="0" y="0"/>
+          <a:chExt cx="0" cy="0"/>
+        </a:xfrm>
+      </p:grpSpPr>
     </p:spTree>
   </p:cSld>
   <mc:AlternateContent>
@@ -14822,7 +17019,7 @@
         <p:spPr>
           <a:xfrm>
             <a:off x="685800" y="0"/>
-            <a:ext cx="10960200" cy="1132560"/>
+            <a:ext cx="10959840" cy="1132200"/>
           </a:xfrm>
           <a:prstGeom prst="rect">
             <a:avLst/>
@@ -14871,7 +17068,17 @@
                 <a:latin typeface="Arial"/>
                 <a:ea typeface="Noto Sans CJK SC"/>
               </a:rPr>
-              <a:t>Why use it (1)</a:t>
+              <a:t>Why use it </a:t>
+            </a:r>
+            <a:r>
+              <a:rPr b="0" lang="en-US" sz="2200" spc="-1" strike="noStrike">
+                <a:solidFill>
+                  <a:srgbClr val="000000"/>
+                </a:solidFill>
+                <a:latin typeface="Arial"/>
+                <a:ea typeface="Noto Sans CJK SC"/>
+              </a:rPr>
+              <a:t>(1)</a:t>
             </a:r>
             <a:endParaRPr b="0" lang="en-US" sz="2200" spc="-1" strike="noStrike">
               <a:latin typeface="Arial"/>
@@ -14888,7 +17095,7 @@
         <p:spPr>
           <a:xfrm>
             <a:off x="274320" y="1554480"/>
-            <a:ext cx="11063520" cy="4479840"/>
+            <a:ext cx="11063160" cy="4479480"/>
           </a:xfrm>
           <a:prstGeom prst="rect">
             <a:avLst/>
@@ -14968,7 +17175,7 @@
         <p:spPr>
           <a:xfrm>
             <a:off x="10515240" y="6202080"/>
-            <a:ext cx="1587600" cy="414720"/>
+            <a:ext cx="1587240" cy="414360"/>
           </a:xfrm>
           <a:prstGeom prst="rect">
             <a:avLst/>
@@ -14994,7 +17201,7 @@
                 <a:spcPct val="100000"/>
               </a:lnSpc>
             </a:pPr>
-            <a:fld id="{804CCA3D-859B-49BA-A218-69FBD83A272B}" type="slidenum">
+            <a:fld id="{C8E43FAE-581E-440A-A987-AF7A5DBA97F6}" type="slidenum">
               <a:rPr b="0" lang="en-US" sz="1600" spc="-1" strike="noStrike">
                 <a:solidFill>
                   <a:srgbClr val="000000"/>
@@ -15023,7 +17230,7 @@
         <p:spPr>
           <a:xfrm>
             <a:off x="1960920" y="2336040"/>
-            <a:ext cx="6542280" cy="3515400"/>
+            <a:ext cx="6541920" cy="3515040"/>
           </a:xfrm>
           <a:prstGeom prst="rect">
             <a:avLst/>
@@ -15072,7 +17279,7 @@
         <p:spPr>
           <a:xfrm>
             <a:off x="685800" y="0"/>
-            <a:ext cx="10960200" cy="1132560"/>
+            <a:ext cx="10959840" cy="1132200"/>
           </a:xfrm>
           <a:prstGeom prst="rect">
             <a:avLst/>
@@ -15121,7 +17328,17 @@
                 <a:latin typeface="Arial"/>
                 <a:ea typeface="Noto Sans CJK SC"/>
               </a:rPr>
-              <a:t>Why use it (2)</a:t>
+              <a:t>Why use it </a:t>
+            </a:r>
+            <a:r>
+              <a:rPr b="0" lang="en-US" sz="2200" spc="-1" strike="noStrike">
+                <a:solidFill>
+                  <a:srgbClr val="000000"/>
+                </a:solidFill>
+                <a:latin typeface="Arial"/>
+                <a:ea typeface="Noto Sans CJK SC"/>
+              </a:rPr>
+              <a:t>(2)</a:t>
             </a:r>
             <a:endParaRPr b="0" lang="en-US" sz="2200" spc="-1" strike="noStrike">
               <a:latin typeface="Arial"/>
@@ -15138,7 +17355,7 @@
         <p:spPr>
           <a:xfrm>
             <a:off x="274320" y="1554480"/>
-            <a:ext cx="11063520" cy="4479840"/>
+            <a:ext cx="11063160" cy="4479480"/>
           </a:xfrm>
           <a:prstGeom prst="rect">
             <a:avLst/>
@@ -15218,7 +17435,7 @@
         <p:spPr>
           <a:xfrm>
             <a:off x="10515240" y="6202080"/>
-            <a:ext cx="1587600" cy="414720"/>
+            <a:ext cx="1587240" cy="414360"/>
           </a:xfrm>
           <a:prstGeom prst="rect">
             <a:avLst/>
@@ -15244,7 +17461,7 @@
                 <a:spcPct val="100000"/>
               </a:lnSpc>
             </a:pPr>
-            <a:fld id="{FDF4A6B3-9CA8-4DFA-9788-5B19437F8B05}" type="slidenum">
+            <a:fld id="{E97B1E8D-1AB2-4832-A12E-20E1F0ACB845}" type="slidenum">
               <a:rPr b="0" lang="en-US" sz="1600" spc="-1" strike="noStrike">
                 <a:solidFill>
                   <a:srgbClr val="000000"/>
@@ -15273,7 +17490,7 @@
         <p:spPr>
           <a:xfrm>
             <a:off x="1814040" y="2743200"/>
-            <a:ext cx="8975160" cy="2046960"/>
+            <a:ext cx="8974800" cy="2046600"/>
           </a:xfrm>
           <a:prstGeom prst="rect">
             <a:avLst/>
@@ -15322,7 +17539,7 @@
         <p:spPr>
           <a:xfrm>
             <a:off x="685800" y="0"/>
-            <a:ext cx="10960200" cy="1132560"/>
+            <a:ext cx="10959840" cy="1132200"/>
           </a:xfrm>
           <a:prstGeom prst="rect">
             <a:avLst/>
@@ -15371,7 +17588,17 @@
                 <a:latin typeface="Arial"/>
                 <a:ea typeface="Noto Sans CJK SC"/>
               </a:rPr>
-              <a:t>Why use it (3)</a:t>
+              <a:t>Why use it </a:t>
+            </a:r>
+            <a:r>
+              <a:rPr b="0" lang="en-US" sz="2200" spc="-1" strike="noStrike">
+                <a:solidFill>
+                  <a:srgbClr val="000000"/>
+                </a:solidFill>
+                <a:latin typeface="Arial"/>
+                <a:ea typeface="Noto Sans CJK SC"/>
+              </a:rPr>
+              <a:t>(3)</a:t>
             </a:r>
             <a:endParaRPr b="0" lang="en-US" sz="2200" spc="-1" strike="noStrike">
               <a:latin typeface="Arial"/>
@@ -15388,7 +17615,7 @@
         <p:spPr>
           <a:xfrm>
             <a:off x="274320" y="1554480"/>
-            <a:ext cx="11063520" cy="4479840"/>
+            <a:ext cx="11063160" cy="4479480"/>
           </a:xfrm>
           <a:prstGeom prst="rect">
             <a:avLst/>
@@ -15445,7 +17672,7 @@
         <p:spPr>
           <a:xfrm>
             <a:off x="10515240" y="6202080"/>
-            <a:ext cx="1587600" cy="414720"/>
+            <a:ext cx="1587240" cy="414360"/>
           </a:xfrm>
           <a:prstGeom prst="rect">
             <a:avLst/>
@@ -15471,7 +17698,7 @@
                 <a:spcPct val="100000"/>
               </a:lnSpc>
             </a:pPr>
-            <a:fld id="{A809864A-CEC2-4E21-A77A-187F38C9FFE9}" type="slidenum">
+            <a:fld id="{2F5431F0-871E-44B7-9738-EEA90F40FA18}" type="slidenum">
               <a:rPr b="0" lang="en-US" sz="1600" spc="-1" strike="noStrike">
                 <a:solidFill>
                   <a:srgbClr val="000000"/>
@@ -15500,7 +17727,7 @@
         <p:spPr>
           <a:xfrm>
             <a:off x="1948680" y="2011680"/>
-            <a:ext cx="8323920" cy="3902760"/>
+            <a:ext cx="8323560" cy="3902400"/>
           </a:xfrm>
           <a:prstGeom prst="rect">
             <a:avLst/>
@@ -15549,7 +17776,7 @@
         <p:spPr>
           <a:xfrm>
             <a:off x="685800" y="0"/>
-            <a:ext cx="10960200" cy="1132560"/>
+            <a:ext cx="10959840" cy="1132200"/>
           </a:xfrm>
           <a:prstGeom prst="rect">
             <a:avLst/>
@@ -15615,7 +17842,7 @@
         <p:spPr>
           <a:xfrm>
             <a:off x="274320" y="1554480"/>
-            <a:ext cx="11063520" cy="4479840"/>
+            <a:ext cx="11063160" cy="4479480"/>
           </a:xfrm>
           <a:prstGeom prst="rect">
             <a:avLst/>
@@ -15672,7 +17899,7 @@
         <p:spPr>
           <a:xfrm>
             <a:off x="10515240" y="6202080"/>
-            <a:ext cx="1587600" cy="414720"/>
+            <a:ext cx="1587240" cy="414360"/>
           </a:xfrm>
           <a:prstGeom prst="rect">
             <a:avLst/>
@@ -15698,7 +17925,7 @@
                 <a:spcPct val="100000"/>
               </a:lnSpc>
             </a:pPr>
-            <a:fld id="{A495795C-AC32-4333-B186-F74571EED16F}" type="slidenum">
+            <a:fld id="{B4CEC3CB-537A-4F63-873F-A2BED1F04841}" type="slidenum">
               <a:rPr b="0" lang="en-US" sz="1600" spc="-1" strike="noStrike">
                 <a:solidFill>
                   <a:srgbClr val="000000"/>
@@ -15727,7 +17954,7 @@
         <p:spPr>
           <a:xfrm>
             <a:off x="2115000" y="2154960"/>
-            <a:ext cx="7028280" cy="3787920"/>
+            <a:ext cx="7027920" cy="3787560"/>
           </a:xfrm>
           <a:prstGeom prst="rect">
             <a:avLst/>
@@ -15776,7 +18003,7 @@
         <p:spPr>
           <a:xfrm>
             <a:off x="685800" y="0"/>
-            <a:ext cx="10960200" cy="1132560"/>
+            <a:ext cx="10959840" cy="1132200"/>
           </a:xfrm>
           <a:prstGeom prst="rect">
             <a:avLst/>
@@ -15842,7 +18069,7 @@
         <p:spPr>
           <a:xfrm>
             <a:off x="274320" y="1554480"/>
-            <a:ext cx="11063520" cy="4479840"/>
+            <a:ext cx="11063160" cy="4479480"/>
           </a:xfrm>
           <a:prstGeom prst="rect">
             <a:avLst/>
@@ -15866,7 +18093,7 @@
             <a:noAutofit/>
           </a:bodyPr>
           <a:p>
-            <a:pPr marL="216000" indent="-215280">
+            <a:pPr marL="216000" indent="-214920">
               <a:lnSpc>
                 <a:spcPct val="100000"/>
               </a:lnSpc>
@@ -15905,7 +18132,7 @@
             </a:endParaRPr>
           </a:p>
           <a:p>
-            <a:pPr marL="216000" indent="-215280">
+            <a:pPr marL="216000" indent="-214920">
               <a:lnSpc>
                 <a:spcPct val="100000"/>
               </a:lnSpc>
@@ -16014,7 +18241,7 @@
             </a:endParaRPr>
           </a:p>
           <a:p>
-            <a:pPr marL="216000" indent="-215280">
+            <a:pPr marL="216000" indent="-214920">
               <a:lnSpc>
                 <a:spcPct val="100000"/>
               </a:lnSpc>
@@ -16053,7 +18280,7 @@
             </a:endParaRPr>
           </a:p>
           <a:p>
-            <a:pPr lvl="1" marL="432000" indent="-215280">
+            <a:pPr lvl="1" marL="432000" indent="-214920">
               <a:lnSpc>
                 <a:spcPct val="100000"/>
               </a:lnSpc>
@@ -16145,7 +18372,7 @@
             </a:endParaRPr>
           </a:p>
           <a:p>
-            <a:pPr lvl="1" marL="432000" indent="-215280">
+            <a:pPr lvl="1" marL="432000" indent="-214920">
               <a:lnSpc>
                 <a:spcPct val="100000"/>
               </a:lnSpc>
@@ -16270,7 +18497,7 @@
         <p:spPr>
           <a:xfrm>
             <a:off x="10515240" y="6202080"/>
-            <a:ext cx="1587600" cy="414720"/>
+            <a:ext cx="1587240" cy="414360"/>
           </a:xfrm>
           <a:prstGeom prst="rect">
             <a:avLst/>
@@ -16296,7 +18523,7 @@
                 <a:spcPct val="100000"/>
               </a:lnSpc>
             </a:pPr>
-            <a:fld id="{D729BD1F-8F10-4CF1-A572-8B2E2E1DE3C0}" type="slidenum">
+            <a:fld id="{64FF0806-B2B9-4EFF-A79D-86468EBF6E89}" type="slidenum">
               <a:rPr b="0" lang="en-US" sz="1600" spc="-1" strike="noStrike">
                 <a:solidFill>
                   <a:srgbClr val="000000"/>
@@ -16351,7 +18578,7 @@
         <p:spPr>
           <a:xfrm>
             <a:off x="685800" y="0"/>
-            <a:ext cx="10960200" cy="1132560"/>
+            <a:ext cx="10959840" cy="1132200"/>
           </a:xfrm>
           <a:prstGeom prst="rect">
             <a:avLst/>
@@ -16417,7 +18644,7 @@
         <p:spPr>
           <a:xfrm>
             <a:off x="274320" y="1554480"/>
-            <a:ext cx="11063520" cy="4479840"/>
+            <a:ext cx="11063160" cy="4479480"/>
           </a:xfrm>
           <a:prstGeom prst="rect">
             <a:avLst/>
@@ -16746,7 +18973,7 @@
         <p:spPr>
           <a:xfrm>
             <a:off x="10515240" y="6202080"/>
-            <a:ext cx="1587600" cy="414720"/>
+            <a:ext cx="1587240" cy="414360"/>
           </a:xfrm>
           <a:prstGeom prst="rect">
             <a:avLst/>
@@ -16772,7 +18999,7 @@
                 <a:spcPct val="100000"/>
               </a:lnSpc>
             </a:pPr>
-            <a:fld id="{8AB347D5-FCD7-4B8A-846D-0F8A7D148EE7}" type="slidenum">
+            <a:fld id="{724470F8-58FD-4554-91DB-631C06D471F2}" type="slidenum">
               <a:rPr b="0" lang="en-US" sz="1600" spc="-1" strike="noStrike">
                 <a:solidFill>
                   <a:srgbClr val="000000"/>

</xml_diff>